<commit_message>
0912 explain epoch power periodicity
</commit_message>
<xml_diff>
--- a/figure/_src/random access delay.pptx
+++ b/figure/_src/random access delay.pptx
@@ -112,6 +112,547 @@
 </p:presentation>
 </file>
 
+<file path=ppt/revisionInfo.xml><?xml version="1.0" encoding="utf-8"?>
+<p1510:revInfo xmlns:a="http://schemas.openxmlformats.org/drawingml/2006/main" xmlns:r="http://schemas.openxmlformats.org/officeDocument/2006/relationships" xmlns:p1510="http://schemas.microsoft.com/office/powerpoint/2015/10/main">
+  <p1510:revLst>
+    <p1510:client id="{B6819BD4-B1C4-4DAB-BA34-43E7313B6BE8}" v="143" dt="2025-09-12T07:42:00.233"/>
+  </p1510:revLst>
+</p1510:revInfo>
+</file>
+
+<file path=ppt/changesInfos/changesInfo1.xml><?xml version="1.0" encoding="utf-8"?>
+<pc:chgInfo xmlns:a="http://schemas.openxmlformats.org/drawingml/2006/main" xmlns:r="http://schemas.openxmlformats.org/officeDocument/2006/relationships" xmlns:ac="http://schemas.microsoft.com/office/drawing/2013/main/command" xmlns:pc="http://schemas.microsoft.com/office/powerpoint/2013/main/command">
+  <pc:docChgLst>
+    <pc:chgData name="帛佑 閻" userId="7ea761d699caffc4" providerId="LiveId" clId="{93A1488A-C1F0-4F25-B301-9D39A3D91BB4}"/>
+    <pc:docChg chg="undo redo custSel modSld">
+      <pc:chgData name="帛佑 閻" userId="7ea761d699caffc4" providerId="LiveId" clId="{93A1488A-C1F0-4F25-B301-9D39A3D91BB4}" dt="2025-09-12T07:42:08.955" v="663" actId="1076"/>
+      <pc:docMkLst>
+        <pc:docMk/>
+      </pc:docMkLst>
+      <pc:sldChg chg="addSp delSp modSp mod">
+        <pc:chgData name="帛佑 閻" userId="7ea761d699caffc4" providerId="LiveId" clId="{93A1488A-C1F0-4F25-B301-9D39A3D91BB4}" dt="2025-09-12T07:42:08.955" v="663" actId="1076"/>
+        <pc:sldMkLst>
+          <pc:docMk/>
+          <pc:sldMk cId="1782975778" sldId="256"/>
+        </pc:sldMkLst>
+        <pc:spChg chg="mod">
+          <ac:chgData name="帛佑 閻" userId="7ea761d699caffc4" providerId="LiveId" clId="{93A1488A-C1F0-4F25-B301-9D39A3D91BB4}" dt="2025-09-12T06:44:36.815" v="90" actId="20577"/>
+          <ac:spMkLst>
+            <pc:docMk/>
+            <pc:sldMk cId="1782975778" sldId="256"/>
+            <ac:spMk id="4" creationId="{932AD9F1-F957-D073-B526-6A6D9412B6E7}"/>
+          </ac:spMkLst>
+        </pc:spChg>
+        <pc:spChg chg="mod">
+          <ac:chgData name="帛佑 閻" userId="7ea761d699caffc4" providerId="LiveId" clId="{93A1488A-C1F0-4F25-B301-9D39A3D91BB4}" dt="2025-09-12T06:45:25.559" v="94" actId="20577"/>
+          <ac:spMkLst>
+            <pc:docMk/>
+            <pc:sldMk cId="1782975778" sldId="256"/>
+            <ac:spMk id="16" creationId="{B4C57583-F2B4-49A8-B708-0F06911212C7}"/>
+          </ac:spMkLst>
+        </pc:spChg>
+        <pc:spChg chg="del">
+          <ac:chgData name="帛佑 閻" userId="7ea761d699caffc4" providerId="LiveId" clId="{93A1488A-C1F0-4F25-B301-9D39A3D91BB4}" dt="2025-09-12T07:41:07.650" v="631" actId="478"/>
+          <ac:spMkLst>
+            <pc:docMk/>
+            <pc:sldMk cId="1782975778" sldId="256"/>
+            <ac:spMk id="22" creationId="{04C79128-62A8-4DD0-BE6C-D4ABCD0D0E65}"/>
+          </ac:spMkLst>
+        </pc:spChg>
+        <pc:spChg chg="mod">
+          <ac:chgData name="帛佑 閻" userId="7ea761d699caffc4" providerId="LiveId" clId="{93A1488A-C1F0-4F25-B301-9D39A3D91BB4}" dt="2025-09-12T06:42:32.005" v="5" actId="403"/>
+          <ac:spMkLst>
+            <pc:docMk/>
+            <pc:sldMk cId="1782975778" sldId="256"/>
+            <ac:spMk id="33" creationId="{707A7CB0-0392-4C22-9F97-980BB96FEB43}"/>
+          </ac:spMkLst>
+        </pc:spChg>
+        <pc:spChg chg="del">
+          <ac:chgData name="帛佑 閻" userId="7ea761d699caffc4" providerId="LiveId" clId="{93A1488A-C1F0-4F25-B301-9D39A3D91BB4}" dt="2025-09-12T07:41:17.764" v="634" actId="478"/>
+          <ac:spMkLst>
+            <pc:docMk/>
+            <pc:sldMk cId="1782975778" sldId="256"/>
+            <ac:spMk id="39" creationId="{C9E14A3A-3C20-4A5C-B0AD-1CD27A975162}"/>
+          </ac:spMkLst>
+        </pc:spChg>
+        <pc:spChg chg="del">
+          <ac:chgData name="帛佑 閻" userId="7ea761d699caffc4" providerId="LiveId" clId="{93A1488A-C1F0-4F25-B301-9D39A3D91BB4}" dt="2025-09-12T07:41:18.671" v="635" actId="478"/>
+          <ac:spMkLst>
+            <pc:docMk/>
+            <pc:sldMk cId="1782975778" sldId="256"/>
+            <ac:spMk id="40" creationId="{D22DFFED-1B75-4E5A-8E76-E2F7451B0D6E}"/>
+          </ac:spMkLst>
+        </pc:spChg>
+        <pc:spChg chg="mod">
+          <ac:chgData name="帛佑 閻" userId="7ea761d699caffc4" providerId="LiveId" clId="{93A1488A-C1F0-4F25-B301-9D39A3D91BB4}" dt="2025-09-12T07:41:04.321" v="630" actId="114"/>
+          <ac:spMkLst>
+            <pc:docMk/>
+            <pc:sldMk cId="1782975778" sldId="256"/>
+            <ac:spMk id="44" creationId="{6EE74FB5-0454-4741-A337-65E577C8D7B3}"/>
+          </ac:spMkLst>
+        </pc:spChg>
+        <pc:spChg chg="mod">
+          <ac:chgData name="帛佑 閻" userId="7ea761d699caffc4" providerId="LiveId" clId="{93A1488A-C1F0-4F25-B301-9D39A3D91BB4}" dt="2025-09-12T07:42:08.955" v="663" actId="1076"/>
+          <ac:spMkLst>
+            <pc:docMk/>
+            <pc:sldMk cId="1782975778" sldId="256"/>
+            <ac:spMk id="53" creationId="{AFFA745B-C9B5-440D-AFB9-825E47FABE2F}"/>
+          </ac:spMkLst>
+        </pc:spChg>
+        <pc:spChg chg="mod">
+          <ac:chgData name="帛佑 閻" userId="7ea761d699caffc4" providerId="LiveId" clId="{93A1488A-C1F0-4F25-B301-9D39A3D91BB4}" dt="2025-09-12T06:44:30.910" v="87" actId="20577"/>
+          <ac:spMkLst>
+            <pc:docMk/>
+            <pc:sldMk cId="1782975778" sldId="256"/>
+            <ac:spMk id="69" creationId="{1ABD6AA3-9E34-487D-9C84-C86B3E425688}"/>
+          </ac:spMkLst>
+        </pc:spChg>
+        <pc:spChg chg="add mod">
+          <ac:chgData name="帛佑 閻" userId="7ea761d699caffc4" providerId="LiveId" clId="{93A1488A-C1F0-4F25-B301-9D39A3D91BB4}" dt="2025-09-12T07:41:15.511" v="633" actId="1076"/>
+          <ac:spMkLst>
+            <pc:docMk/>
+            <pc:sldMk cId="1782975778" sldId="256"/>
+            <ac:spMk id="83" creationId="{A03ED766-D9A9-08AA-9645-6E8643210DB7}"/>
+          </ac:spMkLst>
+        </pc:spChg>
+        <pc:spChg chg="add mod">
+          <ac:chgData name="帛佑 閻" userId="7ea761d699caffc4" providerId="LiveId" clId="{93A1488A-C1F0-4F25-B301-9D39A3D91BB4}" dt="2025-09-12T07:41:24.775" v="637" actId="1076"/>
+          <ac:spMkLst>
+            <pc:docMk/>
+            <pc:sldMk cId="1782975778" sldId="256"/>
+            <ac:spMk id="84" creationId="{2FE40BC7-59ED-A9BD-1E52-F7726A864A63}"/>
+          </ac:spMkLst>
+        </pc:spChg>
+        <pc:spChg chg="add mod">
+          <ac:chgData name="帛佑 閻" userId="7ea761d699caffc4" providerId="LiveId" clId="{93A1488A-C1F0-4F25-B301-9D39A3D91BB4}" dt="2025-09-12T07:41:24.775" v="637" actId="1076"/>
+          <ac:spMkLst>
+            <pc:docMk/>
+            <pc:sldMk cId="1782975778" sldId="256"/>
+            <ac:spMk id="85" creationId="{F999476D-F203-E8AB-3056-D9D28D143F59}"/>
+          </ac:spMkLst>
+        </pc:spChg>
+        <pc:graphicFrameChg chg="add del mod modGraphic">
+          <ac:chgData name="帛佑 閻" userId="7ea761d699caffc4" providerId="LiveId" clId="{93A1488A-C1F0-4F25-B301-9D39A3D91BB4}" dt="2025-09-12T06:51:49.171" v="600" actId="478"/>
+          <ac:graphicFrameMkLst>
+            <pc:docMk/>
+            <pc:sldMk cId="1782975778" sldId="256"/>
+            <ac:graphicFrameMk id="52" creationId="{F2A715AB-8DF8-EB18-E177-21300DB010AF}"/>
+          </ac:graphicFrameMkLst>
+        </pc:graphicFrameChg>
+        <pc:cxnChg chg="add mod">
+          <ac:chgData name="帛佑 閻" userId="7ea761d699caffc4" providerId="LiveId" clId="{93A1488A-C1F0-4F25-B301-9D39A3D91BB4}" dt="2025-09-12T06:51:41.212" v="599" actId="1036"/>
+          <ac:cxnSpMkLst>
+            <pc:docMk/>
+            <pc:sldMk cId="1782975778" sldId="256"/>
+            <ac:cxnSpMk id="8" creationId="{41331521-675E-517B-316C-206502FAE88C}"/>
+          </ac:cxnSpMkLst>
+        </pc:cxnChg>
+        <pc:cxnChg chg="add del mod">
+          <ac:chgData name="帛佑 閻" userId="7ea761d699caffc4" providerId="LiveId" clId="{93A1488A-C1F0-4F25-B301-9D39A3D91BB4}" dt="2025-09-12T06:47:43.356" v="155" actId="478"/>
+          <ac:cxnSpMkLst>
+            <pc:docMk/>
+            <pc:sldMk cId="1782975778" sldId="256"/>
+            <ac:cxnSpMk id="9" creationId="{34FD12E9-5EF7-8F76-A503-E85E30C0932A}"/>
+          </ac:cxnSpMkLst>
+        </pc:cxnChg>
+        <pc:cxnChg chg="add del mod">
+          <ac:chgData name="帛佑 閻" userId="7ea761d699caffc4" providerId="LiveId" clId="{93A1488A-C1F0-4F25-B301-9D39A3D91BB4}" dt="2025-09-12T06:46:29.849" v="116" actId="478"/>
+          <ac:cxnSpMkLst>
+            <pc:docMk/>
+            <pc:sldMk cId="1782975778" sldId="256"/>
+            <ac:cxnSpMk id="11" creationId="{E0316AC0-9383-B618-511F-1AD78A4715DD}"/>
+          </ac:cxnSpMkLst>
+        </pc:cxnChg>
+        <pc:cxnChg chg="add del mod">
+          <ac:chgData name="帛佑 閻" userId="7ea761d699caffc4" providerId="LiveId" clId="{93A1488A-C1F0-4F25-B301-9D39A3D91BB4}" dt="2025-09-12T06:47:43.356" v="155" actId="478"/>
+          <ac:cxnSpMkLst>
+            <pc:docMk/>
+            <pc:sldMk cId="1782975778" sldId="256"/>
+            <ac:cxnSpMk id="13" creationId="{D1128AF7-99F2-F526-66DF-8C66C41FA8A5}"/>
+          </ac:cxnSpMkLst>
+        </pc:cxnChg>
+        <pc:cxnChg chg="add del mod">
+          <ac:chgData name="帛佑 閻" userId="7ea761d699caffc4" providerId="LiveId" clId="{93A1488A-C1F0-4F25-B301-9D39A3D91BB4}" dt="2025-09-12T06:46:55.786" v="145" actId="478"/>
+          <ac:cxnSpMkLst>
+            <pc:docMk/>
+            <pc:sldMk cId="1782975778" sldId="256"/>
+            <ac:cxnSpMk id="14" creationId="{98B7A4A6-51C3-A0EF-9B66-CB39505A6065}"/>
+          </ac:cxnSpMkLst>
+        </pc:cxnChg>
+        <pc:cxnChg chg="add del mod">
+          <ac:chgData name="帛佑 閻" userId="7ea761d699caffc4" providerId="LiveId" clId="{93A1488A-C1F0-4F25-B301-9D39A3D91BB4}" dt="2025-09-12T06:47:43.356" v="155" actId="478"/>
+          <ac:cxnSpMkLst>
+            <pc:docMk/>
+            <pc:sldMk cId="1782975778" sldId="256"/>
+            <ac:cxnSpMk id="15" creationId="{6BD76BCD-087B-BC31-BB48-701294E59CD8}"/>
+          </ac:cxnSpMkLst>
+        </pc:cxnChg>
+        <pc:cxnChg chg="add mod">
+          <ac:chgData name="帛佑 閻" userId="7ea761d699caffc4" providerId="LiveId" clId="{93A1488A-C1F0-4F25-B301-9D39A3D91BB4}" dt="2025-09-12T06:46:48.767" v="139" actId="1076"/>
+          <ac:cxnSpMkLst>
+            <pc:docMk/>
+            <pc:sldMk cId="1782975778" sldId="256"/>
+            <ac:cxnSpMk id="17" creationId="{BC4699B8-C6D4-9D3F-7DCC-F34ADC76BDE4}"/>
+          </ac:cxnSpMkLst>
+        </pc:cxnChg>
+        <pc:cxnChg chg="add mod">
+          <ac:chgData name="帛佑 閻" userId="7ea761d699caffc4" providerId="LiveId" clId="{93A1488A-C1F0-4F25-B301-9D39A3D91BB4}" dt="2025-09-12T06:46:48.767" v="139" actId="1076"/>
+          <ac:cxnSpMkLst>
+            <pc:docMk/>
+            <pc:sldMk cId="1782975778" sldId="256"/>
+            <ac:cxnSpMk id="19" creationId="{F96456F9-861B-F120-1FB8-1A6B32E403E6}"/>
+          </ac:cxnSpMkLst>
+        </pc:cxnChg>
+        <pc:cxnChg chg="add del mod">
+          <ac:chgData name="帛佑 閻" userId="7ea761d699caffc4" providerId="LiveId" clId="{93A1488A-C1F0-4F25-B301-9D39A3D91BB4}" dt="2025-09-12T06:47:07.252" v="152" actId="478"/>
+          <ac:cxnSpMkLst>
+            <pc:docMk/>
+            <pc:sldMk cId="1782975778" sldId="256"/>
+            <ac:cxnSpMk id="20" creationId="{81B1BF11-DF58-6FB3-D569-F07C1600A033}"/>
+          </ac:cxnSpMkLst>
+        </pc:cxnChg>
+        <pc:cxnChg chg="add mod">
+          <ac:chgData name="帛佑 閻" userId="7ea761d699caffc4" providerId="LiveId" clId="{93A1488A-C1F0-4F25-B301-9D39A3D91BB4}" dt="2025-09-12T06:47:05.104" v="151" actId="1038"/>
+          <ac:cxnSpMkLst>
+            <pc:docMk/>
+            <pc:sldMk cId="1782975778" sldId="256"/>
+            <ac:cxnSpMk id="21" creationId="{98739F6E-557C-25D0-64C0-92112254439B}"/>
+          </ac:cxnSpMkLst>
+        </pc:cxnChg>
+        <pc:cxnChg chg="add del mod">
+          <ac:chgData name="帛佑 閻" userId="7ea761d699caffc4" providerId="LiveId" clId="{93A1488A-C1F0-4F25-B301-9D39A3D91BB4}" dt="2025-09-12T06:47:43.356" v="155" actId="478"/>
+          <ac:cxnSpMkLst>
+            <pc:docMk/>
+            <pc:sldMk cId="1782975778" sldId="256"/>
+            <ac:cxnSpMk id="24" creationId="{17DFDF94-1654-6C37-1B93-DAEDAFDB13F1}"/>
+          </ac:cxnSpMkLst>
+        </pc:cxnChg>
+        <pc:cxnChg chg="add del mod">
+          <ac:chgData name="帛佑 閻" userId="7ea761d699caffc4" providerId="LiveId" clId="{93A1488A-C1F0-4F25-B301-9D39A3D91BB4}" dt="2025-09-12T06:47:45.231" v="156" actId="478"/>
+          <ac:cxnSpMkLst>
+            <pc:docMk/>
+            <pc:sldMk cId="1782975778" sldId="256"/>
+            <ac:cxnSpMk id="26" creationId="{E1459B91-D5A4-3E15-17EC-FBA319D7D76D}"/>
+          </ac:cxnSpMkLst>
+        </pc:cxnChg>
+        <pc:cxnChg chg="add del mod">
+          <ac:chgData name="帛佑 閻" userId="7ea761d699caffc4" providerId="LiveId" clId="{93A1488A-C1F0-4F25-B301-9D39A3D91BB4}" dt="2025-09-12T06:47:43.356" v="155" actId="478"/>
+          <ac:cxnSpMkLst>
+            <pc:docMk/>
+            <pc:sldMk cId="1782975778" sldId="256"/>
+            <ac:cxnSpMk id="27" creationId="{BD29E035-270D-7A88-00CE-3CEE6091E9D3}"/>
+          </ac:cxnSpMkLst>
+        </pc:cxnChg>
+        <pc:cxnChg chg="add del mod">
+          <ac:chgData name="帛佑 閻" userId="7ea761d699caffc4" providerId="LiveId" clId="{93A1488A-C1F0-4F25-B301-9D39A3D91BB4}" dt="2025-09-12T06:47:43.356" v="155" actId="478"/>
+          <ac:cxnSpMkLst>
+            <pc:docMk/>
+            <pc:sldMk cId="1782975778" sldId="256"/>
+            <ac:cxnSpMk id="28" creationId="{05C88821-828F-5C80-4A12-B1B74F41A71C}"/>
+          </ac:cxnSpMkLst>
+        </pc:cxnChg>
+        <pc:cxnChg chg="add del mod">
+          <ac:chgData name="帛佑 閻" userId="7ea761d699caffc4" providerId="LiveId" clId="{93A1488A-C1F0-4F25-B301-9D39A3D91BB4}" dt="2025-09-12T06:47:43.356" v="155" actId="478"/>
+          <ac:cxnSpMkLst>
+            <pc:docMk/>
+            <pc:sldMk cId="1782975778" sldId="256"/>
+            <ac:cxnSpMk id="29" creationId="{7EF3EB14-AAAD-76A1-47A5-6E7F849D4CE2}"/>
+          </ac:cxnSpMkLst>
+        </pc:cxnChg>
+        <pc:cxnChg chg="add del mod">
+          <ac:chgData name="帛佑 閻" userId="7ea761d699caffc4" providerId="LiveId" clId="{93A1488A-C1F0-4F25-B301-9D39A3D91BB4}" dt="2025-09-12T06:47:43.356" v="155" actId="478"/>
+          <ac:cxnSpMkLst>
+            <pc:docMk/>
+            <pc:sldMk cId="1782975778" sldId="256"/>
+            <ac:cxnSpMk id="31" creationId="{072337E7-CB38-A0B8-ACFC-DE34B9065E65}"/>
+          </ac:cxnSpMkLst>
+        </pc:cxnChg>
+        <pc:cxnChg chg="add del mod">
+          <ac:chgData name="帛佑 閻" userId="7ea761d699caffc4" providerId="LiveId" clId="{93A1488A-C1F0-4F25-B301-9D39A3D91BB4}" dt="2025-09-12T06:47:43.356" v="155" actId="478"/>
+          <ac:cxnSpMkLst>
+            <pc:docMk/>
+            <pc:sldMk cId="1782975778" sldId="256"/>
+            <ac:cxnSpMk id="32" creationId="{9A7B9D8C-3A91-0C29-C3F5-A18920DCE3B3}"/>
+          </ac:cxnSpMkLst>
+        </pc:cxnChg>
+        <pc:cxnChg chg="add mod">
+          <ac:chgData name="帛佑 閻" userId="7ea761d699caffc4" providerId="LiveId" clId="{93A1488A-C1F0-4F25-B301-9D39A3D91BB4}" dt="2025-09-12T06:47:18.923" v="154" actId="1076"/>
+          <ac:cxnSpMkLst>
+            <pc:docMk/>
+            <pc:sldMk cId="1782975778" sldId="256"/>
+            <ac:cxnSpMk id="34" creationId="{85647968-3C4A-D9EF-4452-FE1FFA26DEB2}"/>
+          </ac:cxnSpMkLst>
+        </pc:cxnChg>
+        <pc:cxnChg chg="add del mod">
+          <ac:chgData name="帛佑 閻" userId="7ea761d699caffc4" providerId="LiveId" clId="{93A1488A-C1F0-4F25-B301-9D39A3D91BB4}" dt="2025-09-12T06:47:43.356" v="155" actId="478"/>
+          <ac:cxnSpMkLst>
+            <pc:docMk/>
+            <pc:sldMk cId="1782975778" sldId="256"/>
+            <ac:cxnSpMk id="35" creationId="{674688E9-9FF1-5842-79E9-0AC19201C15F}"/>
+          </ac:cxnSpMkLst>
+        </pc:cxnChg>
+        <pc:cxnChg chg="add del mod">
+          <ac:chgData name="帛佑 閻" userId="7ea761d699caffc4" providerId="LiveId" clId="{93A1488A-C1F0-4F25-B301-9D39A3D91BB4}" dt="2025-09-12T06:48:47.182" v="174" actId="478"/>
+          <ac:cxnSpMkLst>
+            <pc:docMk/>
+            <pc:sldMk cId="1782975778" sldId="256"/>
+            <ac:cxnSpMk id="36" creationId="{43A87167-2B7F-C072-EBA4-B07DDBD3656E}"/>
+          </ac:cxnSpMkLst>
+        </pc:cxnChg>
+        <pc:cxnChg chg="add del mod">
+          <ac:chgData name="帛佑 閻" userId="7ea761d699caffc4" providerId="LiveId" clId="{93A1488A-C1F0-4F25-B301-9D39A3D91BB4}" dt="2025-09-12T06:48:45.403" v="173" actId="478"/>
+          <ac:cxnSpMkLst>
+            <pc:docMk/>
+            <pc:sldMk cId="1782975778" sldId="256"/>
+            <ac:cxnSpMk id="37" creationId="{E34352C5-9199-D64A-91EB-07A6D3F8492E}"/>
+          </ac:cxnSpMkLst>
+        </pc:cxnChg>
+        <pc:cxnChg chg="add del mod">
+          <ac:chgData name="帛佑 閻" userId="7ea761d699caffc4" providerId="LiveId" clId="{93A1488A-C1F0-4F25-B301-9D39A3D91BB4}" dt="2025-09-12T06:48:35.632" v="172" actId="478"/>
+          <ac:cxnSpMkLst>
+            <pc:docMk/>
+            <pc:sldMk cId="1782975778" sldId="256"/>
+            <ac:cxnSpMk id="45" creationId="{F2237630-F1D5-B1E5-FD17-8FB0CE800C43}"/>
+          </ac:cxnSpMkLst>
+        </pc:cxnChg>
+        <pc:cxnChg chg="add del mod">
+          <ac:chgData name="帛佑 閻" userId="7ea761d699caffc4" providerId="LiveId" clId="{93A1488A-C1F0-4F25-B301-9D39A3D91BB4}" dt="2025-09-12T06:48:35.632" v="172" actId="478"/>
+          <ac:cxnSpMkLst>
+            <pc:docMk/>
+            <pc:sldMk cId="1782975778" sldId="256"/>
+            <ac:cxnSpMk id="47" creationId="{EA5227EC-BD27-2D65-61CC-680A648DF421}"/>
+          </ac:cxnSpMkLst>
+        </pc:cxnChg>
+        <pc:cxnChg chg="add del mod">
+          <ac:chgData name="帛佑 閻" userId="7ea761d699caffc4" providerId="LiveId" clId="{93A1488A-C1F0-4F25-B301-9D39A3D91BB4}" dt="2025-09-12T06:48:57.181" v="177" actId="478"/>
+          <ac:cxnSpMkLst>
+            <pc:docMk/>
+            <pc:sldMk cId="1782975778" sldId="256"/>
+            <ac:cxnSpMk id="50" creationId="{7B37925E-AF69-B177-1DDD-5505F1167438}"/>
+          </ac:cxnSpMkLst>
+        </pc:cxnChg>
+        <pc:cxnChg chg="mod">
+          <ac:chgData name="帛佑 閻" userId="7ea761d699caffc4" providerId="LiveId" clId="{93A1488A-C1F0-4F25-B301-9D39A3D91BB4}" dt="2025-09-12T07:41:50.091" v="650" actId="1035"/>
+          <ac:cxnSpMkLst>
+            <pc:docMk/>
+            <pc:sldMk cId="1782975778" sldId="256"/>
+            <ac:cxnSpMk id="51" creationId="{8AB97597-2142-4ADE-9527-FB5E9AC88E22}"/>
+          </ac:cxnSpMkLst>
+        </pc:cxnChg>
+        <pc:cxnChg chg="add del mod">
+          <ac:chgData name="帛佑 閻" userId="7ea761d699caffc4" providerId="LiveId" clId="{93A1488A-C1F0-4F25-B301-9D39A3D91BB4}" dt="2025-09-12T06:49:31.938" v="194" actId="478"/>
+          <ac:cxnSpMkLst>
+            <pc:docMk/>
+            <pc:sldMk cId="1782975778" sldId="256"/>
+            <ac:cxnSpMk id="55" creationId="{FF04B9F9-7088-04AB-9945-8E60329E484A}"/>
+          </ac:cxnSpMkLst>
+        </pc:cxnChg>
+        <pc:cxnChg chg="add mod">
+          <ac:chgData name="帛佑 閻" userId="7ea761d699caffc4" providerId="LiveId" clId="{93A1488A-C1F0-4F25-B301-9D39A3D91BB4}" dt="2025-09-12T06:51:41.212" v="599" actId="1036"/>
+          <ac:cxnSpMkLst>
+            <pc:docMk/>
+            <pc:sldMk cId="1782975778" sldId="256"/>
+            <ac:cxnSpMk id="56" creationId="{ADD04200-C30F-5CBD-2329-44C1E1AEDCAA}"/>
+          </ac:cxnSpMkLst>
+        </pc:cxnChg>
+        <pc:cxnChg chg="add mod">
+          <ac:chgData name="帛佑 閻" userId="7ea761d699caffc4" providerId="LiveId" clId="{93A1488A-C1F0-4F25-B301-9D39A3D91BB4}" dt="2025-09-12T06:51:41.212" v="599" actId="1036"/>
+          <ac:cxnSpMkLst>
+            <pc:docMk/>
+            <pc:sldMk cId="1782975778" sldId="256"/>
+            <ac:cxnSpMk id="57" creationId="{C8C62FFB-F517-7CEB-4AC3-FEB4A61F61C3}"/>
+          </ac:cxnSpMkLst>
+        </pc:cxnChg>
+        <pc:cxnChg chg="add mod">
+          <ac:chgData name="帛佑 閻" userId="7ea761d699caffc4" providerId="LiveId" clId="{93A1488A-C1F0-4F25-B301-9D39A3D91BB4}" dt="2025-09-12T06:51:41.212" v="599" actId="1036"/>
+          <ac:cxnSpMkLst>
+            <pc:docMk/>
+            <pc:sldMk cId="1782975778" sldId="256"/>
+            <ac:cxnSpMk id="58" creationId="{D7EC5E59-B413-FD07-AC33-C02AA4862E40}"/>
+          </ac:cxnSpMkLst>
+        </pc:cxnChg>
+        <pc:cxnChg chg="add mod">
+          <ac:chgData name="帛佑 閻" userId="7ea761d699caffc4" providerId="LiveId" clId="{93A1488A-C1F0-4F25-B301-9D39A3D91BB4}" dt="2025-09-12T06:50:32.643" v="317" actId="1037"/>
+          <ac:cxnSpMkLst>
+            <pc:docMk/>
+            <pc:sldMk cId="1782975778" sldId="256"/>
+            <ac:cxnSpMk id="59" creationId="{FD24435D-A7A5-AB80-C2C6-F1AB4C857DD9}"/>
+          </ac:cxnSpMkLst>
+        </pc:cxnChg>
+        <pc:cxnChg chg="add mod">
+          <ac:chgData name="帛佑 閻" userId="7ea761d699caffc4" providerId="LiveId" clId="{93A1488A-C1F0-4F25-B301-9D39A3D91BB4}" dt="2025-09-12T06:50:32.643" v="317" actId="1037"/>
+          <ac:cxnSpMkLst>
+            <pc:docMk/>
+            <pc:sldMk cId="1782975778" sldId="256"/>
+            <ac:cxnSpMk id="60" creationId="{EDB8ED24-40FE-0E6A-61C0-46CA7E0C7000}"/>
+          </ac:cxnSpMkLst>
+        </pc:cxnChg>
+        <pc:cxnChg chg="add mod">
+          <ac:chgData name="帛佑 閻" userId="7ea761d699caffc4" providerId="LiveId" clId="{93A1488A-C1F0-4F25-B301-9D39A3D91BB4}" dt="2025-09-12T06:51:41.212" v="599" actId="1036"/>
+          <ac:cxnSpMkLst>
+            <pc:docMk/>
+            <pc:sldMk cId="1782975778" sldId="256"/>
+            <ac:cxnSpMk id="61" creationId="{48720282-0EC6-28D8-B209-95416A33C785}"/>
+          </ac:cxnSpMkLst>
+        </pc:cxnChg>
+        <pc:cxnChg chg="add mod">
+          <ac:chgData name="帛佑 閻" userId="7ea761d699caffc4" providerId="LiveId" clId="{93A1488A-C1F0-4F25-B301-9D39A3D91BB4}" dt="2025-09-12T06:51:41.212" v="599" actId="1036"/>
+          <ac:cxnSpMkLst>
+            <pc:docMk/>
+            <pc:sldMk cId="1782975778" sldId="256"/>
+            <ac:cxnSpMk id="63" creationId="{007D70B1-38A8-962B-7798-D379C0AF869B}"/>
+          </ac:cxnSpMkLst>
+        </pc:cxnChg>
+        <pc:cxnChg chg="add mod">
+          <ac:chgData name="帛佑 閻" userId="7ea761d699caffc4" providerId="LiveId" clId="{93A1488A-C1F0-4F25-B301-9D39A3D91BB4}" dt="2025-09-12T06:50:46.541" v="386" actId="1038"/>
+          <ac:cxnSpMkLst>
+            <pc:docMk/>
+            <pc:sldMk cId="1782975778" sldId="256"/>
+            <ac:cxnSpMk id="64" creationId="{118A5963-C648-8353-361F-2CD26FF52C6B}"/>
+          </ac:cxnSpMkLst>
+        </pc:cxnChg>
+        <pc:cxnChg chg="add mod">
+          <ac:chgData name="帛佑 閻" userId="7ea761d699caffc4" providerId="LiveId" clId="{93A1488A-C1F0-4F25-B301-9D39A3D91BB4}" dt="2025-09-12T06:50:46.541" v="386" actId="1038"/>
+          <ac:cxnSpMkLst>
+            <pc:docMk/>
+            <pc:sldMk cId="1782975778" sldId="256"/>
+            <ac:cxnSpMk id="65" creationId="{3606C582-970E-2968-D889-D3733C72BD56}"/>
+          </ac:cxnSpMkLst>
+        </pc:cxnChg>
+        <pc:cxnChg chg="add mod">
+          <ac:chgData name="帛佑 閻" userId="7ea761d699caffc4" providerId="LiveId" clId="{93A1488A-C1F0-4F25-B301-9D39A3D91BB4}" dt="2025-09-12T06:50:46.541" v="386" actId="1038"/>
+          <ac:cxnSpMkLst>
+            <pc:docMk/>
+            <pc:sldMk cId="1782975778" sldId="256"/>
+            <ac:cxnSpMk id="67" creationId="{D2819800-88D6-6853-39A2-6022B85F1E9A}"/>
+          </ac:cxnSpMkLst>
+        </pc:cxnChg>
+        <pc:cxnChg chg="add mod">
+          <ac:chgData name="帛佑 閻" userId="7ea761d699caffc4" providerId="LiveId" clId="{93A1488A-C1F0-4F25-B301-9D39A3D91BB4}" dt="2025-09-12T06:51:41.212" v="599" actId="1036"/>
+          <ac:cxnSpMkLst>
+            <pc:docMk/>
+            <pc:sldMk cId="1782975778" sldId="256"/>
+            <ac:cxnSpMk id="68" creationId="{CA996563-9969-975E-4383-7FF0E773733A}"/>
+          </ac:cxnSpMkLst>
+        </pc:cxnChg>
+        <pc:cxnChg chg="add mod">
+          <ac:chgData name="帛佑 閻" userId="7ea761d699caffc4" providerId="LiveId" clId="{93A1488A-C1F0-4F25-B301-9D39A3D91BB4}" dt="2025-09-12T06:51:05.701" v="559" actId="1038"/>
+          <ac:cxnSpMkLst>
+            <pc:docMk/>
+            <pc:sldMk cId="1782975778" sldId="256"/>
+            <ac:cxnSpMk id="74" creationId="{D46EF59B-75BE-02C1-6013-8F6014555889}"/>
+          </ac:cxnSpMkLst>
+        </pc:cxnChg>
+        <pc:cxnChg chg="add mod">
+          <ac:chgData name="帛佑 閻" userId="7ea761d699caffc4" providerId="LiveId" clId="{93A1488A-C1F0-4F25-B301-9D39A3D91BB4}" dt="2025-09-12T06:51:41.212" v="599" actId="1036"/>
+          <ac:cxnSpMkLst>
+            <pc:docMk/>
+            <pc:sldMk cId="1782975778" sldId="256"/>
+            <ac:cxnSpMk id="75" creationId="{66C85B76-8A18-6D7C-6002-944EE71C6414}"/>
+          </ac:cxnSpMkLst>
+        </pc:cxnChg>
+        <pc:cxnChg chg="add mod">
+          <ac:chgData name="帛佑 閻" userId="7ea761d699caffc4" providerId="LiveId" clId="{93A1488A-C1F0-4F25-B301-9D39A3D91BB4}" dt="2025-09-12T06:51:41.212" v="599" actId="1036"/>
+          <ac:cxnSpMkLst>
+            <pc:docMk/>
+            <pc:sldMk cId="1782975778" sldId="256"/>
+            <ac:cxnSpMk id="76" creationId="{B91CE342-E267-BCFC-AC85-5449B3F88EBC}"/>
+          </ac:cxnSpMkLst>
+        </pc:cxnChg>
+        <pc:cxnChg chg="add mod">
+          <ac:chgData name="帛佑 閻" userId="7ea761d699caffc4" providerId="LiveId" clId="{93A1488A-C1F0-4F25-B301-9D39A3D91BB4}" dt="2025-09-12T06:51:05.701" v="559" actId="1038"/>
+          <ac:cxnSpMkLst>
+            <pc:docMk/>
+            <pc:sldMk cId="1782975778" sldId="256"/>
+            <ac:cxnSpMk id="77" creationId="{EAEE536F-62B7-486D-8B9D-C1875E4831C3}"/>
+          </ac:cxnSpMkLst>
+        </pc:cxnChg>
+        <pc:cxnChg chg="add del mod">
+          <ac:chgData name="帛佑 閻" userId="7ea761d699caffc4" providerId="LiveId" clId="{93A1488A-C1F0-4F25-B301-9D39A3D91BB4}" dt="2025-09-12T06:51:14.553" v="562" actId="478"/>
+          <ac:cxnSpMkLst>
+            <pc:docMk/>
+            <pc:sldMk cId="1782975778" sldId="256"/>
+            <ac:cxnSpMk id="78" creationId="{B5ABABFC-46BF-044A-ED6B-DF82CEC512D5}"/>
+          </ac:cxnSpMkLst>
+        </pc:cxnChg>
+        <pc:cxnChg chg="add del mod">
+          <ac:chgData name="帛佑 閻" userId="7ea761d699caffc4" providerId="LiveId" clId="{93A1488A-C1F0-4F25-B301-9D39A3D91BB4}" dt="2025-09-12T06:51:14.553" v="562" actId="478"/>
+          <ac:cxnSpMkLst>
+            <pc:docMk/>
+            <pc:sldMk cId="1782975778" sldId="256"/>
+            <ac:cxnSpMk id="79" creationId="{BC0DC38B-2427-77D0-7A88-C59ED9764EDC}"/>
+          </ac:cxnSpMkLst>
+        </pc:cxnChg>
+        <pc:cxnChg chg="add del mod">
+          <ac:chgData name="帛佑 閻" userId="7ea761d699caffc4" providerId="LiveId" clId="{93A1488A-C1F0-4F25-B301-9D39A3D91BB4}" dt="2025-09-12T06:51:14.553" v="562" actId="478"/>
+          <ac:cxnSpMkLst>
+            <pc:docMk/>
+            <pc:sldMk cId="1782975778" sldId="256"/>
+            <ac:cxnSpMk id="80" creationId="{73D53FCD-2623-5CD1-CE9E-8D7DBBF4998A}"/>
+          </ac:cxnSpMkLst>
+        </pc:cxnChg>
+        <pc:cxnChg chg="add del mod">
+          <ac:chgData name="帛佑 閻" userId="7ea761d699caffc4" providerId="LiveId" clId="{93A1488A-C1F0-4F25-B301-9D39A3D91BB4}" dt="2025-09-12T06:51:14.553" v="562" actId="478"/>
+          <ac:cxnSpMkLst>
+            <pc:docMk/>
+            <pc:sldMk cId="1782975778" sldId="256"/>
+            <ac:cxnSpMk id="81" creationId="{DF59F467-3716-B162-603C-278F2F5CC9FB}"/>
+          </ac:cxnSpMkLst>
+        </pc:cxnChg>
+        <pc:cxnChg chg="add mod">
+          <ac:chgData name="帛佑 閻" userId="7ea761d699caffc4" providerId="LiveId" clId="{93A1488A-C1F0-4F25-B301-9D39A3D91BB4}" dt="2025-09-12T06:51:41.212" v="599" actId="1036"/>
+          <ac:cxnSpMkLst>
+            <pc:docMk/>
+            <pc:sldMk cId="1782975778" sldId="256"/>
+            <ac:cxnSpMk id="82" creationId="{8B8814A9-2E96-8448-8067-29771395DD71}"/>
+          </ac:cxnSpMkLst>
+        </pc:cxnChg>
+      </pc:sldChg>
+    </pc:docChg>
+  </pc:docChgLst>
+  <pc:docChgLst>
+    <pc:chgData name="帛佑 閻" userId="7ea761d699caffc4" providerId="Windows Live" clId="Web-{17D5DD9D-B661-89B6-E96B-75DEC256AFEC}"/>
+    <pc:docChg chg="modSld">
+      <pc:chgData name="帛佑 閻" userId="7ea761d699caffc4" providerId="Windows Live" clId="Web-{17D5DD9D-B661-89B6-E96B-75DEC256AFEC}" dt="2025-09-03T10:18:52.277" v="29"/>
+      <pc:docMkLst>
+        <pc:docMk/>
+      </pc:docMkLst>
+      <pc:sldChg chg="addSp delSp modSp">
+        <pc:chgData name="帛佑 閻" userId="7ea761d699caffc4" providerId="Windows Live" clId="Web-{17D5DD9D-B661-89B6-E96B-75DEC256AFEC}" dt="2025-09-03T10:18:52.277" v="29"/>
+        <pc:sldMkLst>
+          <pc:docMk/>
+          <pc:sldMk cId="1782975778" sldId="256"/>
+        </pc:sldMkLst>
+        <pc:spChg chg="add mod">
+          <ac:chgData name="帛佑 閻" userId="7ea761d699caffc4" providerId="Windows Live" clId="Web-{17D5DD9D-B661-89B6-E96B-75DEC256AFEC}" dt="2025-09-03T10:18:48.683" v="27" actId="1076"/>
+          <ac:spMkLst>
+            <pc:docMk/>
+            <pc:sldMk cId="1782975778" sldId="256"/>
+            <ac:spMk id="4" creationId="{932AD9F1-F957-D073-B526-6A6D9412B6E7}"/>
+          </ac:spMkLst>
+        </pc:spChg>
+        <pc:spChg chg="mod">
+          <ac:chgData name="帛佑 閻" userId="7ea761d699caffc4" providerId="Windows Live" clId="Web-{17D5DD9D-B661-89B6-E96B-75DEC256AFEC}" dt="2025-09-03T10:17:16.728" v="4" actId="20577"/>
+          <ac:spMkLst>
+            <pc:docMk/>
+            <pc:sldMk cId="1782975778" sldId="256"/>
+            <ac:spMk id="33" creationId="{707A7CB0-0392-4C22-9F97-980BB96FEB43}"/>
+          </ac:spMkLst>
+        </pc:spChg>
+        <pc:cxnChg chg="mod">
+          <ac:chgData name="帛佑 閻" userId="7ea761d699caffc4" providerId="Windows Live" clId="Web-{17D5DD9D-B661-89B6-E96B-75DEC256AFEC}" dt="2025-09-03T10:17:20.744" v="5" actId="1076"/>
+          <ac:cxnSpMkLst>
+            <pc:docMk/>
+            <pc:sldMk cId="1782975778" sldId="256"/>
+            <ac:cxnSpMk id="51" creationId="{8AB97597-2142-4ADE-9527-FB5E9AC88E22}"/>
+          </ac:cxnSpMkLst>
+        </pc:cxnChg>
+      </pc:sldChg>
+    </pc:docChg>
+  </pc:docChgLst>
+</pc:chgInfo>
+</file>
+
 <file path=ppt/slideLayouts/slideLayout1.xml><?xml version="1.0" encoding="utf-8"?>
 <p:sldLayout xmlns:a="http://schemas.openxmlformats.org/drawingml/2006/main" xmlns:r="http://schemas.openxmlformats.org/officeDocument/2006/relationships" xmlns:p="http://schemas.openxmlformats.org/presentationml/2006/main" type="title" preserve="1">
   <p:cSld name="標題投影片">
@@ -243,7 +784,7 @@
           <a:p>
             <a:fld id="{CF0D0849-A26C-49C4-AF8B-EC180B419FD8}" type="datetimeFigureOut">
               <a:rPr lang="zh-TW" altLang="en-US" smtClean="0"/>
-              <a:t>2025/7/14</a:t>
+              <a:t>2025/9/12</a:t>
             </a:fld>
             <a:endParaRPr lang="zh-TW" altLang="en-US"/>
           </a:p>
@@ -413,7 +954,7 @@
           <a:p>
             <a:fld id="{CF0D0849-A26C-49C4-AF8B-EC180B419FD8}" type="datetimeFigureOut">
               <a:rPr lang="zh-TW" altLang="en-US" smtClean="0"/>
-              <a:t>2025/7/14</a:t>
+              <a:t>2025/9/12</a:t>
             </a:fld>
             <a:endParaRPr lang="zh-TW" altLang="en-US"/>
           </a:p>
@@ -593,7 +1134,7 @@
           <a:p>
             <a:fld id="{CF0D0849-A26C-49C4-AF8B-EC180B419FD8}" type="datetimeFigureOut">
               <a:rPr lang="zh-TW" altLang="en-US" smtClean="0"/>
-              <a:t>2025/7/14</a:t>
+              <a:t>2025/9/12</a:t>
             </a:fld>
             <a:endParaRPr lang="zh-TW" altLang="en-US"/>
           </a:p>
@@ -763,7 +1304,7 @@
           <a:p>
             <a:fld id="{CF0D0849-A26C-49C4-AF8B-EC180B419FD8}" type="datetimeFigureOut">
               <a:rPr lang="zh-TW" altLang="en-US" smtClean="0"/>
-              <a:t>2025/7/14</a:t>
+              <a:t>2025/9/12</a:t>
             </a:fld>
             <a:endParaRPr lang="zh-TW" altLang="en-US"/>
           </a:p>
@@ -1009,7 +1550,7 @@
           <a:p>
             <a:fld id="{CF0D0849-A26C-49C4-AF8B-EC180B419FD8}" type="datetimeFigureOut">
               <a:rPr lang="zh-TW" altLang="en-US" smtClean="0"/>
-              <a:t>2025/7/14</a:t>
+              <a:t>2025/9/12</a:t>
             </a:fld>
             <a:endParaRPr lang="zh-TW" altLang="en-US"/>
           </a:p>
@@ -1241,7 +1782,7 @@
           <a:p>
             <a:fld id="{CF0D0849-A26C-49C4-AF8B-EC180B419FD8}" type="datetimeFigureOut">
               <a:rPr lang="zh-TW" altLang="en-US" smtClean="0"/>
-              <a:t>2025/7/14</a:t>
+              <a:t>2025/9/12</a:t>
             </a:fld>
             <a:endParaRPr lang="zh-TW" altLang="en-US"/>
           </a:p>
@@ -1608,7 +2149,7 @@
           <a:p>
             <a:fld id="{CF0D0849-A26C-49C4-AF8B-EC180B419FD8}" type="datetimeFigureOut">
               <a:rPr lang="zh-TW" altLang="en-US" smtClean="0"/>
-              <a:t>2025/7/14</a:t>
+              <a:t>2025/9/12</a:t>
             </a:fld>
             <a:endParaRPr lang="zh-TW" altLang="en-US"/>
           </a:p>
@@ -1726,7 +2267,7 @@
           <a:p>
             <a:fld id="{CF0D0849-A26C-49C4-AF8B-EC180B419FD8}" type="datetimeFigureOut">
               <a:rPr lang="zh-TW" altLang="en-US" smtClean="0"/>
-              <a:t>2025/7/14</a:t>
+              <a:t>2025/9/12</a:t>
             </a:fld>
             <a:endParaRPr lang="zh-TW" altLang="en-US"/>
           </a:p>
@@ -1821,7 +2362,7 @@
           <a:p>
             <a:fld id="{CF0D0849-A26C-49C4-AF8B-EC180B419FD8}" type="datetimeFigureOut">
               <a:rPr lang="zh-TW" altLang="en-US" smtClean="0"/>
-              <a:t>2025/7/14</a:t>
+              <a:t>2025/9/12</a:t>
             </a:fld>
             <a:endParaRPr lang="zh-TW" altLang="en-US"/>
           </a:p>
@@ -2098,7 +2639,7 @@
           <a:p>
             <a:fld id="{CF0D0849-A26C-49C4-AF8B-EC180B419FD8}" type="datetimeFigureOut">
               <a:rPr lang="zh-TW" altLang="en-US" smtClean="0"/>
-              <a:t>2025/7/14</a:t>
+              <a:t>2025/9/12</a:t>
             </a:fld>
             <a:endParaRPr lang="zh-TW" altLang="en-US"/>
           </a:p>
@@ -2355,7 +2896,7 @@
           <a:p>
             <a:fld id="{CF0D0849-A26C-49C4-AF8B-EC180B419FD8}" type="datetimeFigureOut">
               <a:rPr lang="zh-TW" altLang="en-US" smtClean="0"/>
-              <a:t>2025/7/14</a:t>
+              <a:t>2025/9/12</a:t>
             </a:fld>
             <a:endParaRPr lang="zh-TW" altLang="en-US"/>
           </a:p>
@@ -2568,7 +3109,7 @@
           <a:p>
             <a:fld id="{CF0D0849-A26C-49C4-AF8B-EC180B419FD8}" type="datetimeFigureOut">
               <a:rPr lang="zh-TW" altLang="en-US" smtClean="0"/>
-              <a:t>2025/7/14</a:t>
+              <a:t>2025/9/12</a:t>
             </a:fld>
             <a:endParaRPr lang="zh-TW" altLang="en-US"/>
           </a:p>
@@ -3248,7 +3789,7 @@
         <p:spPr>
           <a:xfrm>
             <a:off x="9354984" y="1228816"/>
-            <a:ext cx="766557" cy="387798"/>
+            <a:ext cx="266420" cy="387798"/>
           </a:xfrm>
           <a:prstGeom prst="rect">
             <a:avLst/>
@@ -3263,15 +3804,7 @@
           <a:p>
             <a:r>
               <a:rPr lang="en-US" altLang="zh-TW" sz="1920" dirty="0"/>
-              <a:t>t (</a:t>
-            </a:r>
-            <a:r>
-              <a:rPr lang="en-US" altLang="zh-TW" sz="1920" dirty="0" err="1"/>
-              <a:t>ms</a:t>
-            </a:r>
-            <a:r>
-              <a:rPr lang="en-US" altLang="zh-TW" sz="1920" dirty="0"/>
-              <a:t>)</a:t>
+              <a:t>t</a:t>
             </a:r>
             <a:endParaRPr lang="zh-TW" altLang="en-US" sz="1920" dirty="0"/>
           </a:p>
@@ -3324,160 +3857,6 @@
           </a:fontRef>
         </p:style>
       </p:cxnSp>
-      <mc:AlternateContent xmlns:mc="http://schemas.openxmlformats.org/markup-compatibility/2006" xmlns:a14="http://schemas.microsoft.com/office/drawing/2010/main">
-        <mc:Choice Requires="a14">
-          <p:sp>
-            <p:nvSpPr>
-              <p:cNvPr id="22" name="文字方塊 21">
-                <a:extLst>
-                  <a:ext uri="{FF2B5EF4-FFF2-40B4-BE49-F238E27FC236}">
-                    <a16:creationId xmlns:a16="http://schemas.microsoft.com/office/drawing/2014/main" id="{04C79128-62A8-4DD0-BE6C-D4ABCD0D0E65}"/>
-                  </a:ext>
-                </a:extLst>
-              </p:cNvPr>
-              <p:cNvSpPr txBox="1"/>
-              <p:nvPr/>
-            </p:nvSpPr>
-            <p:spPr>
-              <a:xfrm>
-                <a:off x="3260209" y="1829304"/>
-                <a:ext cx="835036" cy="455253"/>
-              </a:xfrm>
-              <a:prstGeom prst="rect">
-                <a:avLst/>
-              </a:prstGeom>
-              <a:noFill/>
-            </p:spPr>
-            <p:txBody>
-              <a:bodyPr wrap="none" rtlCol="0">
-                <a:spAutoFit/>
-              </a:bodyPr>
-              <a:lstStyle/>
-              <a:p>
-                <a:pPr/>
-                <a14:m>
-                  <m:oMathPara xmlns:m="http://schemas.openxmlformats.org/officeDocument/2006/math">
-                    <m:oMathParaPr>
-                      <m:jc m:val="centerGroup"/>
-                    </m:oMathParaPr>
-                    <m:oMath xmlns:m="http://schemas.openxmlformats.org/officeDocument/2006/math">
-                      <m:sSubSup>
-                        <m:sSubSupPr>
-                          <m:ctrlPr>
-                            <a:rPr lang="en-US" altLang="zh-TW" sz="2241" i="1">
-                              <a:solidFill>
-                                <a:schemeClr val="tx1">
-                                  <a:lumMod val="50000"/>
-                                  <a:lumOff val="50000"/>
-                                </a:schemeClr>
-                              </a:solidFill>
-                              <a:latin typeface="Cambria Math" panose="02040503050406030204" pitchFamily="18" charset="0"/>
-                            </a:rPr>
-                          </m:ctrlPr>
-                        </m:sSubSupPr>
-                        <m:e>
-                          <m:r>
-                            <a:rPr lang="en-US" altLang="zh-TW" sz="2241" i="1">
-                              <a:solidFill>
-                                <a:schemeClr val="tx1">
-                                  <a:lumMod val="50000"/>
-                                  <a:lumOff val="50000"/>
-                                </a:schemeClr>
-                              </a:solidFill>
-                              <a:latin typeface="Cambria Math" panose="02040503050406030204" pitchFamily="18" charset="0"/>
-                            </a:rPr>
-                            <m:t>𝑇</m:t>
-                          </m:r>
-                        </m:e>
-                        <m:sub>
-                          <m:r>
-                            <a:rPr lang="en-US" altLang="zh-TW" sz="2241" i="1">
-                              <a:solidFill>
-                                <a:schemeClr val="tx1">
-                                  <a:lumMod val="50000"/>
-                                  <a:lumOff val="50000"/>
-                                </a:schemeClr>
-                              </a:solidFill>
-                              <a:latin typeface="Cambria Math" panose="02040503050406030204" pitchFamily="18" charset="0"/>
-                            </a:rPr>
-                            <m:t>𝑘</m:t>
-                          </m:r>
-                        </m:sub>
-                        <m:sup>
-                          <m:r>
-                            <a:rPr lang="en-US" altLang="zh-TW" sz="2241" i="1">
-                              <a:solidFill>
-                                <a:schemeClr val="tx1">
-                                  <a:lumMod val="50000"/>
-                                  <a:lumOff val="50000"/>
-                                </a:schemeClr>
-                              </a:solidFill>
-                              <a:latin typeface="Cambria Math" panose="02040503050406030204" pitchFamily="18" charset="0"/>
-                            </a:rPr>
-                            <m:t>𝑆𝑆𝐵</m:t>
-                          </m:r>
-                        </m:sup>
-                      </m:sSubSup>
-                    </m:oMath>
-                  </m:oMathPara>
-                </a14:m>
-                <a:endParaRPr lang="en-US" altLang="zh-TW" sz="2241" dirty="0">
-                  <a:solidFill>
-                    <a:schemeClr val="tx1">
-                      <a:lumMod val="50000"/>
-                      <a:lumOff val="50000"/>
-                    </a:schemeClr>
-                  </a:solidFill>
-                </a:endParaRPr>
-              </a:p>
-            </p:txBody>
-          </p:sp>
-        </mc:Choice>
-        <mc:Fallback xmlns="">
-          <p:sp>
-            <p:nvSpPr>
-              <p:cNvPr id="22" name="文字方塊 21">
-                <a:extLst>
-                  <a:ext uri="{FF2B5EF4-FFF2-40B4-BE49-F238E27FC236}">
-                    <a16:creationId xmlns:a16="http://schemas.microsoft.com/office/drawing/2014/main" id="{04C79128-62A8-4DD0-BE6C-D4ABCD0D0E65}"/>
-                  </a:ext>
-                </a:extLst>
-              </p:cNvPr>
-              <p:cNvSpPr txBox="1">
-                <a:spLocks noRot="1" noChangeAspect="1" noMove="1" noResize="1" noEditPoints="1" noAdjustHandles="1" noChangeArrowheads="1" noChangeShapeType="1" noTextEdit="1"/>
-              </p:cNvSpPr>
-              <p:nvPr/>
-            </p:nvSpPr>
-            <p:spPr>
-              <a:xfrm>
-                <a:off x="3260209" y="1829304"/>
-                <a:ext cx="835036" cy="455253"/>
-              </a:xfrm>
-              <a:prstGeom prst="rect">
-                <a:avLst/>
-              </a:prstGeom>
-              <a:blipFill>
-                <a:blip r:embed="rId2"/>
-                <a:stretch>
-                  <a:fillRect b="-5333"/>
-                </a:stretch>
-              </a:blipFill>
-            </p:spPr>
-            <p:txBody>
-              <a:bodyPr/>
-              <a:lstStyle/>
-              <a:p>
-                <a:r>
-                  <a:rPr lang="zh-TW" altLang="en-US">
-                    <a:noFill/>
-                  </a:rPr>
-                  <a:t> </a:t>
-                </a:r>
-              </a:p>
-            </p:txBody>
-          </p:sp>
-        </mc:Fallback>
-      </mc:AlternateContent>
       <p:cxnSp>
         <p:nvCxnSpPr>
           <p:cNvPr id="23" name="直線單箭頭接點 22">
@@ -3631,7 +4010,7 @@
         <p:spPr>
           <a:xfrm>
             <a:off x="1939161" y="40059"/>
-            <a:ext cx="2946512" cy="387798"/>
+            <a:ext cx="2913042" cy="384721"/>
           </a:xfrm>
           <a:prstGeom prst="rect">
             <a:avLst/>
@@ -3639,31 +4018,26 @@
           <a:noFill/>
         </p:spPr>
         <p:txBody>
-          <a:bodyPr wrap="none" rtlCol="0">
+          <a:bodyPr wrap="none" lIns="91440" tIns="45720" rIns="91440" bIns="45720" rtlCol="0" anchor="t">
             <a:spAutoFit/>
           </a:bodyPr>
           <a:lstStyle/>
           <a:p>
             <a:r>
-              <a:rPr lang="en-US" altLang="zh-TW" sz="1920" dirty="0">
+              <a:rPr lang="en-US" altLang="zh-TW" sz="1900" dirty="0">
                 <a:solidFill>
                   <a:schemeClr val="accent2"/>
                 </a:solidFill>
+                <a:ea typeface="新細明體"/>
               </a:rPr>
-              <a:t>UE </a:t>
-            </a:r>
-            <a:r>
-              <a:rPr lang="en-US" altLang="zh-TW" sz="1920">
-                <a:solidFill>
-                  <a:schemeClr val="accent2"/>
-                </a:solidFill>
-              </a:rPr>
-              <a:t>starts SSB measurement</a:t>
-            </a:r>
-            <a:endParaRPr lang="zh-TW" altLang="en-US" sz="1920" dirty="0">
+              <a:t>UE starts SSB measurement</a:t>
+            </a:r>
+            <a:endParaRPr lang="zh-TW" altLang="en-US" sz="1900" dirty="0">
               <a:solidFill>
                 <a:schemeClr val="accent2"/>
               </a:solidFill>
+              <a:ea typeface="新細明體"/>
+              <a:cs typeface="Calibri"/>
             </a:endParaRPr>
           </a:p>
         </p:txBody>
@@ -3712,314 +4086,6 @@
           </a:p>
         </p:txBody>
       </p:sp>
-      <mc:AlternateContent xmlns:mc="http://schemas.openxmlformats.org/markup-compatibility/2006" xmlns:a14="http://schemas.microsoft.com/office/drawing/2010/main">
-        <mc:Choice Requires="a14">
-          <p:sp>
-            <p:nvSpPr>
-              <p:cNvPr id="39" name="文字方塊 38">
-                <a:extLst>
-                  <a:ext uri="{FF2B5EF4-FFF2-40B4-BE49-F238E27FC236}">
-                    <a16:creationId xmlns:a16="http://schemas.microsoft.com/office/drawing/2014/main" id="{C9E14A3A-3C20-4A5C-B0AD-1CD27A975162}"/>
-                  </a:ext>
-                </a:extLst>
-              </p:cNvPr>
-              <p:cNvSpPr txBox="1"/>
-              <p:nvPr/>
-            </p:nvSpPr>
-            <p:spPr>
-              <a:xfrm>
-                <a:off x="5317941" y="1769589"/>
-                <a:ext cx="835036" cy="455253"/>
-              </a:xfrm>
-              <a:prstGeom prst="rect">
-                <a:avLst/>
-              </a:prstGeom>
-              <a:noFill/>
-            </p:spPr>
-            <p:txBody>
-              <a:bodyPr wrap="none" rtlCol="0">
-                <a:spAutoFit/>
-              </a:bodyPr>
-              <a:lstStyle/>
-              <a:p>
-                <a:pPr/>
-                <a14:m>
-                  <m:oMathPara xmlns:m="http://schemas.openxmlformats.org/officeDocument/2006/math">
-                    <m:oMathParaPr>
-                      <m:jc m:val="centerGroup"/>
-                    </m:oMathParaPr>
-                    <m:oMath xmlns:m="http://schemas.openxmlformats.org/officeDocument/2006/math">
-                      <m:sSubSup>
-                        <m:sSubSupPr>
-                          <m:ctrlPr>
-                            <a:rPr lang="en-US" altLang="zh-TW" sz="2241" i="1">
-                              <a:solidFill>
-                                <a:schemeClr val="tx1">
-                                  <a:lumMod val="50000"/>
-                                  <a:lumOff val="50000"/>
-                                </a:schemeClr>
-                              </a:solidFill>
-                              <a:latin typeface="Cambria Math" panose="02040503050406030204" pitchFamily="18" charset="0"/>
-                            </a:rPr>
-                          </m:ctrlPr>
-                        </m:sSubSupPr>
-                        <m:e>
-                          <m:r>
-                            <a:rPr lang="en-US" altLang="zh-TW" sz="2241" i="1">
-                              <a:solidFill>
-                                <a:schemeClr val="tx1">
-                                  <a:lumMod val="50000"/>
-                                  <a:lumOff val="50000"/>
-                                </a:schemeClr>
-                              </a:solidFill>
-                              <a:latin typeface="Cambria Math" panose="02040503050406030204" pitchFamily="18" charset="0"/>
-                            </a:rPr>
-                            <m:t>𝑇</m:t>
-                          </m:r>
-                        </m:e>
-                        <m:sub>
-                          <m:r>
-                            <a:rPr lang="en-US" altLang="zh-TW" sz="2241" i="1">
-                              <a:solidFill>
-                                <a:schemeClr val="tx1">
-                                  <a:lumMod val="50000"/>
-                                  <a:lumOff val="50000"/>
-                                </a:schemeClr>
-                              </a:solidFill>
-                              <a:latin typeface="Cambria Math" panose="02040503050406030204" pitchFamily="18" charset="0"/>
-                            </a:rPr>
-                            <m:t>𝑘</m:t>
-                          </m:r>
-                        </m:sub>
-                        <m:sup>
-                          <m:r>
-                            <a:rPr lang="en-US" altLang="zh-TW" sz="2241" i="1">
-                              <a:solidFill>
-                                <a:schemeClr val="tx1">
-                                  <a:lumMod val="50000"/>
-                                  <a:lumOff val="50000"/>
-                                </a:schemeClr>
-                              </a:solidFill>
-                              <a:latin typeface="Cambria Math" panose="02040503050406030204" pitchFamily="18" charset="0"/>
-                            </a:rPr>
-                            <m:t>𝑆𝑆𝐵</m:t>
-                          </m:r>
-                        </m:sup>
-                      </m:sSubSup>
-                    </m:oMath>
-                  </m:oMathPara>
-                </a14:m>
-                <a:endParaRPr lang="en-US" altLang="zh-TW" sz="2241" dirty="0">
-                  <a:solidFill>
-                    <a:schemeClr val="tx1">
-                      <a:lumMod val="50000"/>
-                      <a:lumOff val="50000"/>
-                    </a:schemeClr>
-                  </a:solidFill>
-                </a:endParaRPr>
-              </a:p>
-            </p:txBody>
-          </p:sp>
-        </mc:Choice>
-        <mc:Fallback xmlns="">
-          <p:sp>
-            <p:nvSpPr>
-              <p:cNvPr id="39" name="文字方塊 38">
-                <a:extLst>
-                  <a:ext uri="{FF2B5EF4-FFF2-40B4-BE49-F238E27FC236}">
-                    <a16:creationId xmlns:a16="http://schemas.microsoft.com/office/drawing/2014/main" id="{C9E14A3A-3C20-4A5C-B0AD-1CD27A975162}"/>
-                  </a:ext>
-                </a:extLst>
-              </p:cNvPr>
-              <p:cNvSpPr txBox="1">
-                <a:spLocks noRot="1" noChangeAspect="1" noMove="1" noResize="1" noEditPoints="1" noAdjustHandles="1" noChangeArrowheads="1" noChangeShapeType="1" noTextEdit="1"/>
-              </p:cNvSpPr>
-              <p:nvPr/>
-            </p:nvSpPr>
-            <p:spPr>
-              <a:xfrm>
-                <a:off x="5317941" y="1769589"/>
-                <a:ext cx="835036" cy="455253"/>
-              </a:xfrm>
-              <a:prstGeom prst="rect">
-                <a:avLst/>
-              </a:prstGeom>
-              <a:blipFill>
-                <a:blip r:embed="rId3"/>
-                <a:stretch>
-                  <a:fillRect b="-5333"/>
-                </a:stretch>
-              </a:blipFill>
-            </p:spPr>
-            <p:txBody>
-              <a:bodyPr/>
-              <a:lstStyle/>
-              <a:p>
-                <a:r>
-                  <a:rPr lang="zh-TW" altLang="en-US">
-                    <a:noFill/>
-                  </a:rPr>
-                  <a:t> </a:t>
-                </a:r>
-              </a:p>
-            </p:txBody>
-          </p:sp>
-        </mc:Fallback>
-      </mc:AlternateContent>
-      <mc:AlternateContent xmlns:mc="http://schemas.openxmlformats.org/markup-compatibility/2006" xmlns:a14="http://schemas.microsoft.com/office/drawing/2010/main">
-        <mc:Choice Requires="a14">
-          <p:sp>
-            <p:nvSpPr>
-              <p:cNvPr id="40" name="文字方塊 39">
-                <a:extLst>
-                  <a:ext uri="{FF2B5EF4-FFF2-40B4-BE49-F238E27FC236}">
-                    <a16:creationId xmlns:a16="http://schemas.microsoft.com/office/drawing/2014/main" id="{D22DFFED-1B75-4E5A-8E76-E2F7451B0D6E}"/>
-                  </a:ext>
-                </a:extLst>
-              </p:cNvPr>
-              <p:cNvSpPr txBox="1"/>
-              <p:nvPr/>
-            </p:nvSpPr>
-            <p:spPr>
-              <a:xfrm>
-                <a:off x="7364160" y="1757172"/>
-                <a:ext cx="835036" cy="455253"/>
-              </a:xfrm>
-              <a:prstGeom prst="rect">
-                <a:avLst/>
-              </a:prstGeom>
-              <a:noFill/>
-            </p:spPr>
-            <p:txBody>
-              <a:bodyPr wrap="none" rtlCol="0">
-                <a:spAutoFit/>
-              </a:bodyPr>
-              <a:lstStyle/>
-              <a:p>
-                <a:pPr/>
-                <a14:m>
-                  <m:oMathPara xmlns:m="http://schemas.openxmlformats.org/officeDocument/2006/math">
-                    <m:oMathParaPr>
-                      <m:jc m:val="centerGroup"/>
-                    </m:oMathParaPr>
-                    <m:oMath xmlns:m="http://schemas.openxmlformats.org/officeDocument/2006/math">
-                      <m:sSubSup>
-                        <m:sSubSupPr>
-                          <m:ctrlPr>
-                            <a:rPr lang="en-US" altLang="zh-TW" sz="2241" i="1">
-                              <a:solidFill>
-                                <a:schemeClr val="tx1">
-                                  <a:lumMod val="50000"/>
-                                  <a:lumOff val="50000"/>
-                                </a:schemeClr>
-                              </a:solidFill>
-                              <a:latin typeface="Cambria Math" panose="02040503050406030204" pitchFamily="18" charset="0"/>
-                            </a:rPr>
-                          </m:ctrlPr>
-                        </m:sSubSupPr>
-                        <m:e>
-                          <m:r>
-                            <a:rPr lang="en-US" altLang="zh-TW" sz="2241" i="1">
-                              <a:solidFill>
-                                <a:schemeClr val="tx1">
-                                  <a:lumMod val="50000"/>
-                                  <a:lumOff val="50000"/>
-                                </a:schemeClr>
-                              </a:solidFill>
-                              <a:latin typeface="Cambria Math" panose="02040503050406030204" pitchFamily="18" charset="0"/>
-                            </a:rPr>
-                            <m:t>𝑇</m:t>
-                          </m:r>
-                        </m:e>
-                        <m:sub>
-                          <m:r>
-                            <a:rPr lang="en-US" altLang="zh-TW" sz="2241" i="1">
-                              <a:solidFill>
-                                <a:schemeClr val="tx1">
-                                  <a:lumMod val="50000"/>
-                                  <a:lumOff val="50000"/>
-                                </a:schemeClr>
-                              </a:solidFill>
-                              <a:latin typeface="Cambria Math" panose="02040503050406030204" pitchFamily="18" charset="0"/>
-                            </a:rPr>
-                            <m:t>𝑘</m:t>
-                          </m:r>
-                        </m:sub>
-                        <m:sup>
-                          <m:r>
-                            <a:rPr lang="en-US" altLang="zh-TW" sz="2241" i="1">
-                              <a:solidFill>
-                                <a:schemeClr val="tx1">
-                                  <a:lumMod val="50000"/>
-                                  <a:lumOff val="50000"/>
-                                </a:schemeClr>
-                              </a:solidFill>
-                              <a:latin typeface="Cambria Math" panose="02040503050406030204" pitchFamily="18" charset="0"/>
-                            </a:rPr>
-                            <m:t>𝑆𝑆𝐵</m:t>
-                          </m:r>
-                        </m:sup>
-                      </m:sSubSup>
-                    </m:oMath>
-                  </m:oMathPara>
-                </a14:m>
-                <a:endParaRPr lang="en-US" altLang="zh-TW" sz="2241" dirty="0">
-                  <a:solidFill>
-                    <a:schemeClr val="tx1">
-                      <a:lumMod val="50000"/>
-                      <a:lumOff val="50000"/>
-                    </a:schemeClr>
-                  </a:solidFill>
-                </a:endParaRPr>
-              </a:p>
-            </p:txBody>
-          </p:sp>
-        </mc:Choice>
-        <mc:Fallback xmlns="">
-          <p:sp>
-            <p:nvSpPr>
-              <p:cNvPr id="40" name="文字方塊 39">
-                <a:extLst>
-                  <a:ext uri="{FF2B5EF4-FFF2-40B4-BE49-F238E27FC236}">
-                    <a16:creationId xmlns:a16="http://schemas.microsoft.com/office/drawing/2014/main" id="{D22DFFED-1B75-4E5A-8E76-E2F7451B0D6E}"/>
-                  </a:ext>
-                </a:extLst>
-              </p:cNvPr>
-              <p:cNvSpPr txBox="1">
-                <a:spLocks noRot="1" noChangeAspect="1" noMove="1" noResize="1" noEditPoints="1" noAdjustHandles="1" noChangeArrowheads="1" noChangeShapeType="1" noTextEdit="1"/>
-              </p:cNvSpPr>
-              <p:nvPr/>
-            </p:nvSpPr>
-            <p:spPr>
-              <a:xfrm>
-                <a:off x="7364160" y="1757172"/>
-                <a:ext cx="835036" cy="455253"/>
-              </a:xfrm>
-              <a:prstGeom prst="rect">
-                <a:avLst/>
-              </a:prstGeom>
-              <a:blipFill>
-                <a:blip r:embed="rId4"/>
-                <a:stretch>
-                  <a:fillRect b="-5333"/>
-                </a:stretch>
-              </a:blipFill>
-            </p:spPr>
-            <p:txBody>
-              <a:bodyPr/>
-              <a:lstStyle/>
-              <a:p>
-                <a:r>
-                  <a:rPr lang="zh-TW" altLang="en-US">
-                    <a:noFill/>
-                  </a:rPr>
-                  <a:t> </a:t>
-                </a:r>
-              </a:p>
-            </p:txBody>
-          </p:sp>
-        </mc:Fallback>
-      </mc:AlternateContent>
       <p:cxnSp>
         <p:nvCxnSpPr>
           <p:cNvPr id="41" name="直線單箭頭接點 40">
@@ -4149,8 +4215,8 @@
           </a:fontRef>
         </p:style>
       </p:cxnSp>
-      <mc:AlternateContent xmlns:mc="http://schemas.openxmlformats.org/markup-compatibility/2006" xmlns:a14="http://schemas.microsoft.com/office/drawing/2010/main">
-        <mc:Choice Requires="a14">
+      <mc:AlternateContent xmlns:mc="http://schemas.openxmlformats.org/markup-compatibility/2006">
+        <mc:Choice xmlns:a14="http://schemas.microsoft.com/office/drawing/2010/main" Requires="a14">
           <p:sp>
             <p:nvSpPr>
               <p:cNvPr id="44" name="文字方塊 43">
@@ -4166,7 +4232,7 @@
             <p:spPr>
               <a:xfrm>
                 <a:off x="1211293" y="1829304"/>
-                <a:ext cx="835036" cy="455253"/>
+                <a:ext cx="712118" cy="369332"/>
               </a:xfrm>
               <a:prstGeom prst="rect">
                 <a:avLst/>
@@ -4177,88 +4243,81 @@
               <a:bodyPr wrap="none" rtlCol="0">
                 <a:spAutoFit/>
               </a:bodyPr>
-              <a:lstStyle/>
+              <a:lstStyle>
+                <a:defPPr>
+                  <a:defRPr lang="en-US"/>
+                </a:defPPr>
+                <a:lvl1pPr>
+                  <a:defRPr sz="2241" i="1">
+                    <a:solidFill>
+                      <a:schemeClr val="tx1">
+                        <a:lumMod val="50000"/>
+                        <a:lumOff val="50000"/>
+                      </a:schemeClr>
+                    </a:solidFill>
+                    <a:latin typeface="Cambria Math" panose="02040503050406030204" pitchFamily="18" charset="0"/>
+                  </a:defRPr>
+                </a:lvl1pPr>
+              </a:lstStyle>
               <a:p>
-                <a:pPr/>
                 <a14:m>
                   <m:oMathPara xmlns:m="http://schemas.openxmlformats.org/officeDocument/2006/math">
                     <m:oMathParaPr>
                       <m:jc m:val="centerGroup"/>
                     </m:oMathParaPr>
                     <m:oMath xmlns:m="http://schemas.openxmlformats.org/officeDocument/2006/math">
-                      <m:sSubSup>
-                        <m:sSubSupPr>
+                      <m:sSub>
+                        <m:sSubPr>
                           <m:ctrlPr>
-                            <a:rPr lang="en-US" altLang="zh-TW" sz="2241" i="1">
-                              <a:solidFill>
-                                <a:schemeClr val="tx1">
-                                  <a:lumMod val="50000"/>
-                                  <a:lumOff val="50000"/>
-                                </a:schemeClr>
-                              </a:solidFill>
-                              <a:latin typeface="Cambria Math" panose="02040503050406030204" pitchFamily="18" charset="0"/>
-                            </a:rPr>
+                            <a:rPr lang="en-US" altLang="zh-TW"/>
                           </m:ctrlPr>
-                        </m:sSubSupPr>
+                        </m:sSubPr>
                         <m:e>
                           <m:r>
-                            <a:rPr lang="en-US" altLang="zh-TW" sz="2241" i="1">
-                              <a:solidFill>
-                                <a:schemeClr val="tx1">
-                                  <a:lumMod val="50000"/>
-                                  <a:lumOff val="50000"/>
-                                </a:schemeClr>
-                              </a:solidFill>
-                              <a:latin typeface="Cambria Math" panose="02040503050406030204" pitchFamily="18" charset="0"/>
-                            </a:rPr>
-                            <m:t>𝑇</m:t>
+                            <m:rPr>
+                              <m:sty m:val="p"/>
+                            </m:rPr>
+                            <a:rPr lang="en-US" altLang="zh-TW"/>
+                            <m:t>θ</m:t>
                           </m:r>
                         </m:e>
                         <m:sub>
                           <m:r>
-                            <a:rPr lang="en-US" altLang="zh-TW" sz="2241" i="1">
-                              <a:solidFill>
-                                <a:schemeClr val="tx1">
-                                  <a:lumMod val="50000"/>
-                                  <a:lumOff val="50000"/>
-                                </a:schemeClr>
-                              </a:solidFill>
-                              <a:latin typeface="Cambria Math" panose="02040503050406030204" pitchFamily="18" charset="0"/>
-                            </a:rPr>
+                            <a:rPr lang="en-US" altLang="zh-TW"/>
                             <m:t>𝑘</m:t>
                           </m:r>
                         </m:sub>
-                        <m:sup>
-                          <m:r>
-                            <a:rPr lang="en-US" altLang="zh-TW" sz="2241" i="1">
-                              <a:solidFill>
-                                <a:schemeClr val="tx1">
-                                  <a:lumMod val="50000"/>
-                                  <a:lumOff val="50000"/>
-                                </a:schemeClr>
-                              </a:solidFill>
-                              <a:latin typeface="Cambria Math" panose="02040503050406030204" pitchFamily="18" charset="0"/>
-                            </a:rPr>
-                            <m:t>𝑆𝑆𝐵</m:t>
-                          </m:r>
-                        </m:sup>
-                      </m:sSubSup>
+                      </m:sSub>
+                      <m:r>
+                        <m:rPr>
+                          <m:nor/>
+                        </m:rPr>
+                        <a:rPr lang="en-US" altLang="zh-TW" i="0"/>
+                        <m:t>[</m:t>
+                      </m:r>
+                      <m:r>
+                        <m:rPr>
+                          <m:nor/>
+                        </m:rPr>
+                        <a:rPr lang="en-US" altLang="zh-TW" i="0"/>
+                        <m:t>s</m:t>
+                      </m:r>
+                      <m:r>
+                        <m:rPr>
+                          <m:nor/>
+                        </m:rPr>
+                        <a:rPr lang="en-US" altLang="zh-TW" i="0"/>
+                        <m:t>]</m:t>
+                      </m:r>
                     </m:oMath>
                   </m:oMathPara>
                 </a14:m>
-                <a:endParaRPr lang="en-US" altLang="zh-TW" sz="2241" dirty="0">
-                  <a:solidFill>
-                    <a:schemeClr val="tx1">
-                      <a:lumMod val="50000"/>
-                      <a:lumOff val="50000"/>
-                    </a:schemeClr>
-                  </a:solidFill>
-                </a:endParaRPr>
+                <a:endParaRPr lang="en-US" altLang="zh-TW" i="0" dirty="0"/>
               </a:p>
             </p:txBody>
           </p:sp>
         </mc:Choice>
-        <mc:Fallback xmlns="">
+        <mc:Fallback>
           <p:sp>
             <p:nvSpPr>
               <p:cNvPr id="44" name="文字方塊 43">
@@ -4276,15 +4335,15 @@
             <p:spPr>
               <a:xfrm>
                 <a:off x="1211293" y="1829304"/>
-                <a:ext cx="835036" cy="455253"/>
+                <a:ext cx="712118" cy="369332"/>
               </a:xfrm>
               <a:prstGeom prst="rect">
                 <a:avLst/>
               </a:prstGeom>
               <a:blipFill>
-                <a:blip r:embed="rId5"/>
+                <a:blip r:embed="rId2"/>
                 <a:stretch>
-                  <a:fillRect b="-5333"/>
+                  <a:fillRect r="-1399" b="-19444"/>
                 </a:stretch>
               </a:blipFill>
             </p:spPr>
@@ -4451,7 +4510,7 @@
         </p:nvCxnSpPr>
         <p:spPr>
           <a:xfrm>
-            <a:off x="3275123" y="1451785"/>
+            <a:off x="3299783" y="1439164"/>
             <a:ext cx="3544384" cy="0"/>
           </a:xfrm>
           <a:prstGeom prst="straightConnector1">
@@ -4480,8 +4539,8 @@
           </a:fontRef>
         </p:style>
       </p:cxnSp>
-      <mc:AlternateContent xmlns:mc="http://schemas.openxmlformats.org/markup-compatibility/2006" xmlns:a14="http://schemas.microsoft.com/office/drawing/2010/main">
-        <mc:Choice Requires="a14">
+      <mc:AlternateContent xmlns:mc="http://schemas.openxmlformats.org/markup-compatibility/2006">
+        <mc:Choice xmlns:a14="http://schemas.microsoft.com/office/drawing/2010/main" Requires="a14">
           <p:sp>
             <p:nvSpPr>
               <p:cNvPr id="53" name="文字方塊 52">
@@ -4496,8 +4555,8 @@
             </p:nvSpPr>
             <p:spPr>
               <a:xfrm>
-                <a:off x="3680921" y="1344575"/>
-                <a:ext cx="2942280" cy="387798"/>
+                <a:off x="3624720" y="1350940"/>
+                <a:ext cx="2977546" cy="387798"/>
               </a:xfrm>
               <a:prstGeom prst="rect">
                 <a:avLst/>
@@ -4515,7 +4574,7 @@
                     <m:sSub>
                       <m:sSubPr>
                         <m:ctrlPr>
-                          <a:rPr lang="en-US" altLang="zh-TW" sz="1920" i="1">
+                          <a:rPr lang="en-US" altLang="zh-TW" sz="1920" i="1" smtClean="0">
                             <a:solidFill>
                               <a:srgbClr val="FF0000"/>
                             </a:solidFill>
@@ -4525,13 +4584,13 @@
                       </m:sSubPr>
                       <m:e>
                         <m:r>
-                          <a:rPr lang="en-US" altLang="zh-TW" sz="1920" i="1">
+                          <a:rPr lang="en-US" altLang="zh-TW" sz="1920" b="0" i="1" smtClean="0">
                             <a:solidFill>
                               <a:srgbClr val="FF0000"/>
                             </a:solidFill>
                             <a:latin typeface="Cambria Math" panose="02040503050406030204" pitchFamily="18" charset="0"/>
                           </a:rPr>
-                          <m:t>𝑇</m:t>
+                          <m:t>𝛼</m:t>
                         </m:r>
                       </m:e>
                       <m:sub>
@@ -4574,7 +4633,7 @@
             </p:txBody>
           </p:sp>
         </mc:Choice>
-        <mc:Fallback xmlns="">
+        <mc:Fallback>
           <p:sp>
             <p:nvSpPr>
               <p:cNvPr id="53" name="文字方塊 52">
@@ -4591,16 +4650,16 @@
             </p:nvSpPr>
             <p:spPr>
               <a:xfrm>
-                <a:off x="3680921" y="1344575"/>
-                <a:ext cx="2942280" cy="387798"/>
+                <a:off x="3624720" y="1350940"/>
+                <a:ext cx="2977546" cy="387798"/>
               </a:xfrm>
               <a:prstGeom prst="rect">
                 <a:avLst/>
               </a:prstGeom>
               <a:blipFill>
-                <a:blip r:embed="rId6"/>
+                <a:blip r:embed="rId3"/>
                 <a:stretch>
-                  <a:fillRect t="-6349" r="-1037" b="-28571"/>
+                  <a:fillRect t="-6349" r="-820" b="-28571"/>
                 </a:stretch>
               </a:blipFill>
             </p:spPr>
@@ -4753,14 +4812,14 @@
           </a:fontRef>
         </p:style>
       </p:cxnSp>
-      <mc:AlternateContent xmlns:mc="http://schemas.openxmlformats.org/markup-compatibility/2006" xmlns:a14="http://schemas.microsoft.com/office/drawing/2010/main">
-        <mc:Choice Requires="a14">
+      <mc:AlternateContent xmlns:mc="http://schemas.openxmlformats.org/markup-compatibility/2006">
+        <mc:Choice xmlns:a14="http://schemas.microsoft.com/office/drawing/2010/main" Requires="a14">
           <p:sp>
             <p:nvSpPr>
-              <p:cNvPr id="68" name="文字方塊 67">
+              <p:cNvPr id="69" name="文字方塊 68">
                 <a:extLst>
                   <a:ext uri="{FF2B5EF4-FFF2-40B4-BE49-F238E27FC236}">
-                    <a16:creationId xmlns:a16="http://schemas.microsoft.com/office/drawing/2014/main" id="{A95162E6-E7DD-442F-BB88-3224BB03F9E0}"/>
+                    <a16:creationId xmlns:a16="http://schemas.microsoft.com/office/drawing/2014/main" id="{1ABD6AA3-9E34-487D-9C84-C86B3E425688}"/>
                   </a:ext>
                 </a:extLst>
               </p:cNvPr>
@@ -4769,8 +4828,8 @@
             </p:nvSpPr>
             <p:spPr>
               <a:xfrm>
-                <a:off x="3724087" y="277967"/>
-                <a:ext cx="483273" cy="397353"/>
+                <a:off x="5577507" y="267896"/>
+                <a:ext cx="769378" cy="387798"/>
               </a:xfrm>
               <a:prstGeom prst="rect">
                 <a:avLst/>
@@ -4790,31 +4849,31 @@
                       <m:jc m:val="centerGroup"/>
                     </m:oMathParaPr>
                     <m:oMath xmlns:m="http://schemas.openxmlformats.org/officeDocument/2006/math">
-                      <m:sSubSup>
-                        <m:sSubSupPr>
+                      <m:sSub>
+                        <m:sSubPr>
                           <m:ctrlPr>
-                            <a:rPr lang="en-US" altLang="zh-TW" sz="1920" i="1">
+                            <a:rPr lang="en-US" altLang="zh-TW" sz="1920" b="0" i="1" smtClean="0">
                               <a:solidFill>
                                 <a:srgbClr val="FF0000"/>
                               </a:solidFill>
                               <a:latin typeface="Cambria Math" panose="02040503050406030204" pitchFamily="18" charset="0"/>
                             </a:rPr>
                           </m:ctrlPr>
-                        </m:sSubSupPr>
+                        </m:sSubPr>
                         <m:e>
                           <m:r>
-                            <a:rPr lang="en-US" altLang="zh-TW" sz="1920" i="1">
+                            <a:rPr lang="en-US" altLang="zh-TW" sz="1920" b="0" i="1" smtClean="0">
                               <a:solidFill>
                                 <a:srgbClr val="FF0000"/>
                               </a:solidFill>
                               <a:latin typeface="Cambria Math" panose="02040503050406030204" pitchFamily="18" charset="0"/>
                             </a:rPr>
-                            <m:t>𝑇</m:t>
+                            <m:t>𝛾</m:t>
                           </m:r>
                         </m:e>
                         <m:sub>
                           <m:r>
-                            <a:rPr lang="en-US" altLang="zh-TW" sz="1920" i="1">
+                            <a:rPr lang="en-US" altLang="zh-TW" sz="1920" b="0" i="1" smtClean="0">
                               <a:solidFill>
                                 <a:srgbClr val="FF0000"/>
                               </a:solidFill>
@@ -4823,18 +4882,34 @@
                             <m:t>𝑢</m:t>
                           </m:r>
                         </m:sub>
-                        <m:sup>
-                          <m:r>
-                            <a:rPr lang="en-US" altLang="zh-TW" sz="1920" i="1">
-                              <a:solidFill>
-                                <a:srgbClr val="FF0000"/>
-                              </a:solidFill>
-                              <a:latin typeface="Cambria Math" panose="02040503050406030204" pitchFamily="18" charset="0"/>
-                            </a:rPr>
-                            <m:t>𝑖</m:t>
-                          </m:r>
-                        </m:sup>
-                      </m:sSubSup>
+                      </m:sSub>
+                      <m:r>
+                        <a:rPr lang="en-US" altLang="zh-TW" sz="1920" b="0" i="1" smtClean="0">
+                          <a:solidFill>
+                            <a:srgbClr val="FF0000"/>
+                          </a:solidFill>
+                          <a:latin typeface="Cambria Math" panose="02040503050406030204" pitchFamily="18" charset="0"/>
+                        </a:rPr>
+                        <m:t>[</m:t>
+                      </m:r>
+                      <m:r>
+                        <a:rPr lang="en-US" altLang="zh-TW" sz="1920" b="0" i="1" smtClean="0">
+                          <a:solidFill>
+                            <a:srgbClr val="FF0000"/>
+                          </a:solidFill>
+                          <a:latin typeface="Cambria Math" panose="02040503050406030204" pitchFamily="18" charset="0"/>
+                        </a:rPr>
+                        <m:t>𝑠</m:t>
+                      </m:r>
+                      <m:r>
+                        <a:rPr lang="en-US" altLang="zh-TW" sz="1920" b="0" i="1" smtClean="0">
+                          <a:solidFill>
+                            <a:srgbClr val="FF0000"/>
+                          </a:solidFill>
+                          <a:latin typeface="Cambria Math" panose="02040503050406030204" pitchFamily="18" charset="0"/>
+                        </a:rPr>
+                        <m:t>]</m:t>
+                      </m:r>
                     </m:oMath>
                   </m:oMathPara>
                 </a14:m>
@@ -4847,13 +4922,13 @@
             </p:txBody>
           </p:sp>
         </mc:Choice>
-        <mc:Fallback xmlns="">
+        <mc:Fallback>
           <p:sp>
             <p:nvSpPr>
-              <p:cNvPr id="68" name="文字方塊 67">
+              <p:cNvPr id="69" name="文字方塊 68">
                 <a:extLst>
                   <a:ext uri="{FF2B5EF4-FFF2-40B4-BE49-F238E27FC236}">
-                    <a16:creationId xmlns:a16="http://schemas.microsoft.com/office/drawing/2014/main" id="{A95162E6-E7DD-442F-BB88-3224BB03F9E0}"/>
+                    <a16:creationId xmlns:a16="http://schemas.microsoft.com/office/drawing/2014/main" id="{1ABD6AA3-9E34-487D-9C84-C86B3E425688}"/>
                   </a:ext>
                 </a:extLst>
               </p:cNvPr>
@@ -4864,16 +4939,16 @@
             </p:nvSpPr>
             <p:spPr>
               <a:xfrm>
-                <a:off x="3724087" y="277967"/>
-                <a:ext cx="483273" cy="397353"/>
+                <a:off x="5577507" y="267896"/>
+                <a:ext cx="769378" cy="387798"/>
               </a:xfrm>
               <a:prstGeom prst="rect">
                 <a:avLst/>
               </a:prstGeom>
               <a:blipFill>
-                <a:blip r:embed="rId7"/>
+                <a:blip r:embed="rId4"/>
                 <a:stretch>
-                  <a:fillRect/>
+                  <a:fillRect b="-14063"/>
                 </a:stretch>
               </a:blipFill>
             </p:spPr>
@@ -4892,14 +4967,190 @@
           </p:sp>
         </mc:Fallback>
       </mc:AlternateContent>
-      <mc:AlternateContent xmlns:mc="http://schemas.openxmlformats.org/markup-compatibility/2006" xmlns:a14="http://schemas.microsoft.com/office/drawing/2010/main">
-        <mc:Choice Requires="a14">
+      <p:sp>
+        <p:nvSpPr>
+          <p:cNvPr id="70" name="文字方塊 69">
+            <a:extLst>
+              <a:ext uri="{FF2B5EF4-FFF2-40B4-BE49-F238E27FC236}">
+                <a16:creationId xmlns:a16="http://schemas.microsoft.com/office/drawing/2014/main" id="{6784C8CA-B9D5-429E-970D-C12B1866E338}"/>
+              </a:ext>
+            </a:extLst>
+          </p:cNvPr>
+          <p:cNvSpPr txBox="1"/>
+          <p:nvPr/>
+        </p:nvSpPr>
+        <p:spPr>
+          <a:xfrm>
+            <a:off x="2398657" y="2227209"/>
+            <a:ext cx="546945" cy="387798"/>
+          </a:xfrm>
+          <a:prstGeom prst="rect">
+            <a:avLst/>
+          </a:prstGeom>
+          <a:noFill/>
+        </p:spPr>
+        <p:txBody>
+          <a:bodyPr wrap="none" rtlCol="0">
+            <a:spAutoFit/>
+          </a:bodyPr>
+          <a:lstStyle/>
+          <a:p>
+            <a:r>
+              <a:rPr lang="en-US" altLang="zh-TW" sz="1920" dirty="0">
+                <a:solidFill>
+                  <a:schemeClr val="accent1"/>
+                </a:solidFill>
+              </a:rPr>
+              <a:t>SSB</a:t>
+            </a:r>
+            <a:endParaRPr lang="zh-TW" altLang="en-US" sz="1920" dirty="0">
+              <a:solidFill>
+                <a:schemeClr val="accent1"/>
+              </a:solidFill>
+            </a:endParaRPr>
+          </a:p>
+        </p:txBody>
+      </p:sp>
+      <p:sp>
+        <p:nvSpPr>
+          <p:cNvPr id="71" name="文字方塊 70">
+            <a:extLst>
+              <a:ext uri="{FF2B5EF4-FFF2-40B4-BE49-F238E27FC236}">
+                <a16:creationId xmlns:a16="http://schemas.microsoft.com/office/drawing/2014/main" id="{E39B3278-280C-49F9-9F15-6E23CB94B5DA}"/>
+              </a:ext>
+            </a:extLst>
+          </p:cNvPr>
+          <p:cNvSpPr txBox="1"/>
+          <p:nvPr/>
+        </p:nvSpPr>
+        <p:spPr>
+          <a:xfrm>
+            <a:off x="4444870" y="2216151"/>
+            <a:ext cx="546945" cy="387798"/>
+          </a:xfrm>
+          <a:prstGeom prst="rect">
+            <a:avLst/>
+          </a:prstGeom>
+          <a:noFill/>
+        </p:spPr>
+        <p:txBody>
+          <a:bodyPr wrap="none" rtlCol="0">
+            <a:spAutoFit/>
+          </a:bodyPr>
+          <a:lstStyle/>
+          <a:p>
+            <a:r>
+              <a:rPr lang="en-US" altLang="zh-TW" sz="1920" dirty="0">
+                <a:solidFill>
+                  <a:schemeClr val="accent1"/>
+                </a:solidFill>
+              </a:rPr>
+              <a:t>SSB</a:t>
+            </a:r>
+            <a:endParaRPr lang="zh-TW" altLang="en-US" sz="1920" dirty="0">
+              <a:solidFill>
+                <a:schemeClr val="accent1"/>
+              </a:solidFill>
+            </a:endParaRPr>
+          </a:p>
+        </p:txBody>
+      </p:sp>
+      <p:sp>
+        <p:nvSpPr>
+          <p:cNvPr id="72" name="文字方塊 71">
+            <a:extLst>
+              <a:ext uri="{FF2B5EF4-FFF2-40B4-BE49-F238E27FC236}">
+                <a16:creationId xmlns:a16="http://schemas.microsoft.com/office/drawing/2014/main" id="{CB9CA4F5-E57C-4BA3-A02F-61F5E860667A}"/>
+              </a:ext>
+            </a:extLst>
+          </p:cNvPr>
+          <p:cNvSpPr txBox="1"/>
+          <p:nvPr/>
+        </p:nvSpPr>
+        <p:spPr>
+          <a:xfrm>
+            <a:off x="6491087" y="2227206"/>
+            <a:ext cx="546945" cy="387798"/>
+          </a:xfrm>
+          <a:prstGeom prst="rect">
+            <a:avLst/>
+          </a:prstGeom>
+          <a:noFill/>
+        </p:spPr>
+        <p:txBody>
+          <a:bodyPr wrap="none" rtlCol="0">
+            <a:spAutoFit/>
+          </a:bodyPr>
+          <a:lstStyle/>
+          <a:p>
+            <a:r>
+              <a:rPr lang="en-US" altLang="zh-TW" sz="1920" dirty="0">
+                <a:solidFill>
+                  <a:schemeClr val="accent1"/>
+                </a:solidFill>
+              </a:rPr>
+              <a:t>SSB</a:t>
+            </a:r>
+            <a:endParaRPr lang="zh-TW" altLang="en-US" sz="1920" dirty="0">
+              <a:solidFill>
+                <a:schemeClr val="accent1"/>
+              </a:solidFill>
+            </a:endParaRPr>
+          </a:p>
+        </p:txBody>
+      </p:sp>
+      <p:sp>
+        <p:nvSpPr>
+          <p:cNvPr id="73" name="文字方塊 72">
+            <a:extLst>
+              <a:ext uri="{FF2B5EF4-FFF2-40B4-BE49-F238E27FC236}">
+                <a16:creationId xmlns:a16="http://schemas.microsoft.com/office/drawing/2014/main" id="{82650C91-4F5C-40DA-BEC8-08591029D134}"/>
+              </a:ext>
+            </a:extLst>
+          </p:cNvPr>
+          <p:cNvSpPr txBox="1"/>
+          <p:nvPr/>
+        </p:nvSpPr>
+        <p:spPr>
+          <a:xfrm>
+            <a:off x="8537315" y="2221345"/>
+            <a:ext cx="546945" cy="387798"/>
+          </a:xfrm>
+          <a:prstGeom prst="rect">
+            <a:avLst/>
+          </a:prstGeom>
+          <a:noFill/>
+        </p:spPr>
+        <p:txBody>
+          <a:bodyPr wrap="none" rtlCol="0">
+            <a:spAutoFit/>
+          </a:bodyPr>
+          <a:lstStyle/>
+          <a:p>
+            <a:r>
+              <a:rPr lang="en-US" altLang="zh-TW" sz="1920" dirty="0">
+                <a:solidFill>
+                  <a:schemeClr val="accent1"/>
+                </a:solidFill>
+              </a:rPr>
+              <a:t>SSB</a:t>
+            </a:r>
+            <a:endParaRPr lang="zh-TW" altLang="en-US" sz="1920" dirty="0">
+              <a:solidFill>
+                <a:schemeClr val="accent1"/>
+              </a:solidFill>
+            </a:endParaRPr>
+          </a:p>
+        </p:txBody>
+      </p:sp>
+      <mc:AlternateContent xmlns:mc="http://schemas.openxmlformats.org/markup-compatibility/2006">
+        <mc:Choice xmlns:a14="http://schemas.microsoft.com/office/drawing/2010/main" Requires="a14">
           <p:sp>
             <p:nvSpPr>
-              <p:cNvPr id="69" name="文字方塊 68">
+              <p:cNvPr id="4" name="文字方塊 3">
                 <a:extLst>
                   <a:ext uri="{FF2B5EF4-FFF2-40B4-BE49-F238E27FC236}">
-                    <a16:creationId xmlns:a16="http://schemas.microsoft.com/office/drawing/2014/main" id="{1ABD6AA3-9E34-487D-9C84-C86B3E425688}"/>
+                    <a16:creationId xmlns:a16="http://schemas.microsoft.com/office/drawing/2014/main" id="{932AD9F1-F957-D073-B526-6A6D9412B6E7}"/>
                   </a:ext>
                 </a:extLst>
               </p:cNvPr>
@@ -4908,8 +5159,8 @@
             </p:nvSpPr>
             <p:spPr>
               <a:xfrm>
-                <a:off x="5510284" y="263258"/>
-                <a:ext cx="483273" cy="393056"/>
+                <a:off x="3897402" y="278871"/>
+                <a:ext cx="794898" cy="387798"/>
               </a:xfrm>
               <a:prstGeom prst="rect">
                 <a:avLst/>
@@ -4920,79 +5171,80 @@
               <a:bodyPr wrap="none" rtlCol="0">
                 <a:spAutoFit/>
               </a:bodyPr>
-              <a:lstStyle/>
+              <a:lstStyle>
+                <a:defPPr>
+                  <a:defRPr lang="en-US"/>
+                </a:defPPr>
+                <a:lvl1pPr>
+                  <a:defRPr sz="1920" b="0" i="1">
+                    <a:solidFill>
+                      <a:srgbClr val="FF0000"/>
+                    </a:solidFill>
+                    <a:latin typeface="Cambria Math" panose="02040503050406030204" pitchFamily="18" charset="0"/>
+                  </a:defRPr>
+                </a:lvl1pPr>
+              </a:lstStyle>
               <a:p>
-                <a:pPr/>
                 <a14:m>
-                  <m:oMathPara xmlns:m="http://schemas.openxmlformats.org/officeDocument/2006/math">
-                    <m:oMathParaPr>
-                      <m:jc m:val="centerGroup"/>
-                    </m:oMathParaPr>
-                    <m:oMath xmlns:m="http://schemas.openxmlformats.org/officeDocument/2006/math">
-                      <m:sSubSup>
-                        <m:sSubSupPr>
-                          <m:ctrlPr>
-                            <a:rPr lang="en-US" altLang="zh-TW" sz="1920" i="1">
-                              <a:solidFill>
-                                <a:srgbClr val="FF0000"/>
-                              </a:solidFill>
-                              <a:latin typeface="Cambria Math" panose="02040503050406030204" pitchFamily="18" charset="0"/>
-                            </a:rPr>
-                          </m:ctrlPr>
-                        </m:sSubSupPr>
-                        <m:e>
-                          <m:r>
-                            <a:rPr lang="en-US" altLang="zh-TW" sz="1920" i="1">
-                              <a:solidFill>
-                                <a:srgbClr val="FF0000"/>
-                              </a:solidFill>
-                              <a:latin typeface="Cambria Math" panose="02040503050406030204" pitchFamily="18" charset="0"/>
-                            </a:rPr>
-                            <m:t>𝑇</m:t>
-                          </m:r>
-                        </m:e>
-                        <m:sub>
-                          <m:r>
-                            <a:rPr lang="en-US" altLang="zh-TW" sz="1920" i="1">
-                              <a:solidFill>
-                                <a:srgbClr val="FF0000"/>
-                              </a:solidFill>
-                              <a:latin typeface="Cambria Math" panose="02040503050406030204" pitchFamily="18" charset="0"/>
-                            </a:rPr>
-                            <m:t>𝑢</m:t>
-                          </m:r>
-                        </m:sub>
-                        <m:sup>
-                          <m:r>
-                            <a:rPr lang="en-US" altLang="zh-TW" sz="1920" i="1">
-                              <a:solidFill>
-                                <a:srgbClr val="FF0000"/>
-                              </a:solidFill>
-                              <a:latin typeface="Cambria Math" panose="02040503050406030204" pitchFamily="18" charset="0"/>
-                            </a:rPr>
-                            <m:t>𝑙</m:t>
-                          </m:r>
-                        </m:sup>
-                      </m:sSubSup>
-                    </m:oMath>
-                  </m:oMathPara>
+                  <m:oMath xmlns:m="http://schemas.openxmlformats.org/officeDocument/2006/math">
+                    <m:sSub>
+                      <m:sSubPr>
+                        <m:ctrlPr>
+                          <a:rPr lang="en-US" altLang="zh-TW" b="0" i="1" smtClean="0">
+                            <a:latin typeface="Cambria Math" panose="02040503050406030204" pitchFamily="18" charset="0"/>
+                          </a:rPr>
+                        </m:ctrlPr>
+                      </m:sSubPr>
+                      <m:e>
+                        <m:r>
+                          <a:rPr lang="en-US" altLang="zh-TW" smtClean="0"/>
+                          <m:t>𝛽</m:t>
+                        </m:r>
+                      </m:e>
+                      <m:sub>
+                        <m:r>
+                          <a:rPr lang="en-US" altLang="zh-TW" b="0" i="1" smtClean="0">
+                            <a:latin typeface="Cambria Math" panose="02040503050406030204" pitchFamily="18" charset="0"/>
+                          </a:rPr>
+                          <m:t>𝑢</m:t>
+                        </m:r>
+                      </m:sub>
+                    </m:sSub>
+                    <m:r>
+                      <a:rPr lang="en-US" altLang="zh-TW" b="0" i="1" smtClean="0">
+                        <a:latin typeface="Cambria Math" panose="02040503050406030204" pitchFamily="18" charset="0"/>
+                      </a:rPr>
+                      <m:t>[</m:t>
+                    </m:r>
+                    <m:r>
+                      <a:rPr lang="en-US" altLang="zh-TW" b="0" i="1" smtClean="0">
+                        <a:latin typeface="Cambria Math" panose="02040503050406030204" pitchFamily="18" charset="0"/>
+                      </a:rPr>
+                      <m:t>𝑠</m:t>
+                    </m:r>
+                    <m:r>
+                      <a:rPr lang="en-US" altLang="zh-TW" b="0" i="1" smtClean="0">
+                        <a:latin typeface="Cambria Math" panose="02040503050406030204" pitchFamily="18" charset="0"/>
+                      </a:rPr>
+                      <m:t>]</m:t>
+                    </m:r>
+                  </m:oMath>
                 </a14:m>
-                <a:endParaRPr lang="zh-TW" altLang="en-US" sz="1920" dirty="0">
-                  <a:solidFill>
-                    <a:srgbClr val="FF0000"/>
-                  </a:solidFill>
-                </a:endParaRPr>
+                <a:r>
+                  <a:rPr lang="zh-TW" altLang="en-US" dirty="0"/>
+                  <a:t> </a:t>
+                </a:r>
               </a:p>
             </p:txBody>
           </p:sp>
         </mc:Choice>
-        <mc:Fallback xmlns="">
+        <mc:Fallback>
           <p:sp>
             <p:nvSpPr>
-              <p:cNvPr id="69" name="文字方塊 68">
+              <p:cNvPr id="4" name="文字方塊 3">
                 <a:extLst>
                   <a:ext uri="{FF2B5EF4-FFF2-40B4-BE49-F238E27FC236}">
-                    <a16:creationId xmlns:a16="http://schemas.microsoft.com/office/drawing/2014/main" id="{1ABD6AA3-9E34-487D-9C84-C86B3E425688}"/>
+                    <a16:creationId xmlns:a16="http://schemas.microsoft.com/office/drawing/2014/main" id="{932AD9F1-F957-D073-B526-6A6D9412B6E7}"/>
                   </a:ext>
                 </a:extLst>
               </p:cNvPr>
@@ -5003,16 +5255,16 @@
             </p:nvSpPr>
             <p:spPr>
               <a:xfrm>
-                <a:off x="5510284" y="263258"/>
-                <a:ext cx="483273" cy="393056"/>
+                <a:off x="3897402" y="278871"/>
+                <a:ext cx="794898" cy="387798"/>
               </a:xfrm>
               <a:prstGeom prst="rect">
                 <a:avLst/>
               </a:prstGeom>
               <a:blipFill>
-                <a:blip r:embed="rId8"/>
+                <a:blip r:embed="rId5"/>
                 <a:stretch>
-                  <a:fillRect/>
+                  <a:fillRect l="-2290" b="-17460"/>
                 </a:stretch>
               </a:blipFill>
             </p:spPr>
@@ -5031,182 +5283,1076 @@
           </p:sp>
         </mc:Fallback>
       </mc:AlternateContent>
-      <p:sp>
-        <p:nvSpPr>
-          <p:cNvPr id="70" name="文字方塊 69">
+      <p:cxnSp>
+        <p:nvCxnSpPr>
+          <p:cNvPr id="8" name="直線接點 7">
             <a:extLst>
               <a:ext uri="{FF2B5EF4-FFF2-40B4-BE49-F238E27FC236}">
-                <a16:creationId xmlns:a16="http://schemas.microsoft.com/office/drawing/2014/main" id="{6784C8CA-B9D5-429E-970D-C12B1866E338}"/>
+                <a16:creationId xmlns:a16="http://schemas.microsoft.com/office/drawing/2014/main" id="{41331521-675E-517B-316C-206502FAE88C}"/>
               </a:ext>
             </a:extLst>
           </p:cNvPr>
-          <p:cNvSpPr txBox="1"/>
+          <p:cNvCxnSpPr/>
           <p:nvPr/>
-        </p:nvSpPr>
+        </p:nvCxnSpPr>
         <p:spPr>
           <a:xfrm>
-            <a:off x="2398657" y="2227209"/>
-            <a:ext cx="546945" cy="387798"/>
-          </a:xfrm>
-          <a:prstGeom prst="rect">
+            <a:off x="665603" y="1127585"/>
+            <a:ext cx="0" cy="229430"/>
+          </a:xfrm>
+          <a:prstGeom prst="line">
             <a:avLst/>
           </a:prstGeom>
-          <a:noFill/>
-        </p:spPr>
-        <p:txBody>
-          <a:bodyPr wrap="none" rtlCol="0">
-            <a:spAutoFit/>
-          </a:bodyPr>
-          <a:lstStyle/>
-          <a:p>
-            <a:r>
-              <a:rPr lang="en-US" altLang="zh-TW" sz="1920" dirty="0">
-                <a:solidFill>
-                  <a:schemeClr val="accent1"/>
-                </a:solidFill>
-              </a:rPr>
-              <a:t>SSB</a:t>
-            </a:r>
-            <a:endParaRPr lang="zh-TW" altLang="en-US" sz="1920" dirty="0">
-              <a:solidFill>
-                <a:schemeClr val="accent1"/>
-              </a:solidFill>
-            </a:endParaRPr>
-          </a:p>
-        </p:txBody>
-      </p:sp>
-      <p:sp>
-        <p:nvSpPr>
-          <p:cNvPr id="71" name="文字方塊 70">
+          <a:ln w="19050"/>
+        </p:spPr>
+        <p:style>
+          <a:lnRef idx="1">
+            <a:schemeClr val="dk1"/>
+          </a:lnRef>
+          <a:fillRef idx="0">
+            <a:schemeClr val="dk1"/>
+          </a:fillRef>
+          <a:effectRef idx="0">
+            <a:schemeClr val="dk1"/>
+          </a:effectRef>
+          <a:fontRef idx="minor">
+            <a:schemeClr val="tx1"/>
+          </a:fontRef>
+        </p:style>
+      </p:cxnSp>
+      <p:cxnSp>
+        <p:nvCxnSpPr>
+          <p:cNvPr id="56" name="直線接點 55">
             <a:extLst>
               <a:ext uri="{FF2B5EF4-FFF2-40B4-BE49-F238E27FC236}">
-                <a16:creationId xmlns:a16="http://schemas.microsoft.com/office/drawing/2014/main" id="{E39B3278-280C-49F9-9F15-6E23CB94B5DA}"/>
+                <a16:creationId xmlns:a16="http://schemas.microsoft.com/office/drawing/2014/main" id="{ADD04200-C30F-5CBD-2329-44C1E1AEDCAA}"/>
               </a:ext>
             </a:extLst>
           </p:cNvPr>
-          <p:cNvSpPr txBox="1"/>
+          <p:cNvCxnSpPr/>
           <p:nvPr/>
-        </p:nvSpPr>
+        </p:nvCxnSpPr>
         <p:spPr>
           <a:xfrm>
-            <a:off x="4444870" y="2216151"/>
-            <a:ext cx="546945" cy="387798"/>
-          </a:xfrm>
-          <a:prstGeom prst="rect">
+            <a:off x="1161383" y="1126541"/>
+            <a:ext cx="0" cy="229430"/>
+          </a:xfrm>
+          <a:prstGeom prst="line">
             <a:avLst/>
           </a:prstGeom>
-          <a:noFill/>
-        </p:spPr>
-        <p:txBody>
-          <a:bodyPr wrap="none" rtlCol="0">
-            <a:spAutoFit/>
-          </a:bodyPr>
-          <a:lstStyle/>
-          <a:p>
-            <a:r>
-              <a:rPr lang="en-US" altLang="zh-TW" sz="1920" dirty="0">
-                <a:solidFill>
-                  <a:schemeClr val="accent1"/>
-                </a:solidFill>
-              </a:rPr>
-              <a:t>SSB</a:t>
-            </a:r>
-            <a:endParaRPr lang="zh-TW" altLang="en-US" sz="1920" dirty="0">
-              <a:solidFill>
-                <a:schemeClr val="accent1"/>
-              </a:solidFill>
-            </a:endParaRPr>
-          </a:p>
-        </p:txBody>
-      </p:sp>
-      <p:sp>
-        <p:nvSpPr>
-          <p:cNvPr id="72" name="文字方塊 71">
+          <a:ln w="19050"/>
+        </p:spPr>
+        <p:style>
+          <a:lnRef idx="1">
+            <a:schemeClr val="dk1"/>
+          </a:lnRef>
+          <a:fillRef idx="0">
+            <a:schemeClr val="dk1"/>
+          </a:fillRef>
+          <a:effectRef idx="0">
+            <a:schemeClr val="dk1"/>
+          </a:effectRef>
+          <a:fontRef idx="minor">
+            <a:schemeClr val="tx1"/>
+          </a:fontRef>
+        </p:style>
+      </p:cxnSp>
+      <p:cxnSp>
+        <p:nvCxnSpPr>
+          <p:cNvPr id="57" name="直線接點 56">
             <a:extLst>
               <a:ext uri="{FF2B5EF4-FFF2-40B4-BE49-F238E27FC236}">
-                <a16:creationId xmlns:a16="http://schemas.microsoft.com/office/drawing/2014/main" id="{CB9CA4F5-E57C-4BA3-A02F-61F5E860667A}"/>
+                <a16:creationId xmlns:a16="http://schemas.microsoft.com/office/drawing/2014/main" id="{C8C62FFB-F517-7CEB-4AC3-FEB4A61F61C3}"/>
               </a:ext>
             </a:extLst>
           </p:cNvPr>
-          <p:cNvSpPr txBox="1"/>
+          <p:cNvCxnSpPr/>
           <p:nvPr/>
-        </p:nvSpPr>
+        </p:nvCxnSpPr>
         <p:spPr>
           <a:xfrm>
-            <a:off x="6491087" y="2227206"/>
-            <a:ext cx="546945" cy="387798"/>
-          </a:xfrm>
-          <a:prstGeom prst="rect">
+            <a:off x="1677826" y="1126541"/>
+            <a:ext cx="0" cy="229430"/>
+          </a:xfrm>
+          <a:prstGeom prst="line">
             <a:avLst/>
           </a:prstGeom>
-          <a:noFill/>
-        </p:spPr>
-        <p:txBody>
-          <a:bodyPr wrap="none" rtlCol="0">
-            <a:spAutoFit/>
-          </a:bodyPr>
-          <a:lstStyle/>
-          <a:p>
-            <a:r>
-              <a:rPr lang="en-US" altLang="zh-TW" sz="1920" dirty="0">
-                <a:solidFill>
-                  <a:schemeClr val="accent1"/>
-                </a:solidFill>
-              </a:rPr>
-              <a:t>SSB</a:t>
-            </a:r>
-            <a:endParaRPr lang="zh-TW" altLang="en-US" sz="1920" dirty="0">
-              <a:solidFill>
-                <a:schemeClr val="accent1"/>
-              </a:solidFill>
-            </a:endParaRPr>
-          </a:p>
-        </p:txBody>
-      </p:sp>
-      <p:sp>
-        <p:nvSpPr>
-          <p:cNvPr id="73" name="文字方塊 72">
+          <a:ln w="19050"/>
+        </p:spPr>
+        <p:style>
+          <a:lnRef idx="1">
+            <a:schemeClr val="dk1"/>
+          </a:lnRef>
+          <a:fillRef idx="0">
+            <a:schemeClr val="dk1"/>
+          </a:fillRef>
+          <a:effectRef idx="0">
+            <a:schemeClr val="dk1"/>
+          </a:effectRef>
+          <a:fontRef idx="minor">
+            <a:schemeClr val="tx1"/>
+          </a:fontRef>
+        </p:style>
+      </p:cxnSp>
+      <p:cxnSp>
+        <p:nvCxnSpPr>
+          <p:cNvPr id="58" name="直線接點 57">
             <a:extLst>
               <a:ext uri="{FF2B5EF4-FFF2-40B4-BE49-F238E27FC236}">
-                <a16:creationId xmlns:a16="http://schemas.microsoft.com/office/drawing/2014/main" id="{82650C91-4F5C-40DA-BEC8-08591029D134}"/>
+                <a16:creationId xmlns:a16="http://schemas.microsoft.com/office/drawing/2014/main" id="{D7EC5E59-B413-FD07-AC33-C02AA4862E40}"/>
               </a:ext>
             </a:extLst>
           </p:cNvPr>
-          <p:cNvSpPr txBox="1"/>
+          <p:cNvCxnSpPr/>
           <p:nvPr/>
-        </p:nvSpPr>
+        </p:nvCxnSpPr>
         <p:spPr>
           <a:xfrm>
-            <a:off x="8537315" y="2221345"/>
-            <a:ext cx="546945" cy="387798"/>
-          </a:xfrm>
-          <a:prstGeom prst="rect">
+            <a:off x="2201839" y="1126541"/>
+            <a:ext cx="0" cy="229430"/>
+          </a:xfrm>
+          <a:prstGeom prst="line">
             <a:avLst/>
           </a:prstGeom>
-          <a:noFill/>
-        </p:spPr>
-        <p:txBody>
-          <a:bodyPr wrap="none" rtlCol="0">
-            <a:spAutoFit/>
-          </a:bodyPr>
-          <a:lstStyle/>
-          <a:p>
-            <a:r>
-              <a:rPr lang="en-US" altLang="zh-TW" sz="1920" dirty="0">
-                <a:solidFill>
-                  <a:schemeClr val="accent1"/>
-                </a:solidFill>
-              </a:rPr>
-              <a:t>SSB</a:t>
-            </a:r>
-            <a:endParaRPr lang="zh-TW" altLang="en-US" sz="1920" dirty="0">
-              <a:solidFill>
-                <a:schemeClr val="accent1"/>
-              </a:solidFill>
-            </a:endParaRPr>
-          </a:p>
-        </p:txBody>
-      </p:sp>
+          <a:ln w="19050"/>
+        </p:spPr>
+        <p:style>
+          <a:lnRef idx="1">
+            <a:schemeClr val="dk1"/>
+          </a:lnRef>
+          <a:fillRef idx="0">
+            <a:schemeClr val="dk1"/>
+          </a:fillRef>
+          <a:effectRef idx="0">
+            <a:schemeClr val="dk1"/>
+          </a:effectRef>
+          <a:fontRef idx="minor">
+            <a:schemeClr val="tx1"/>
+          </a:fontRef>
+        </p:style>
+      </p:cxnSp>
+      <p:cxnSp>
+        <p:nvCxnSpPr>
+          <p:cNvPr id="59" name="直線接點 58">
+            <a:extLst>
+              <a:ext uri="{FF2B5EF4-FFF2-40B4-BE49-F238E27FC236}">
+                <a16:creationId xmlns:a16="http://schemas.microsoft.com/office/drawing/2014/main" id="{FD24435D-A7A5-AB80-C2C6-F1AB4C857DD9}"/>
+              </a:ext>
+            </a:extLst>
+          </p:cNvPr>
+          <p:cNvCxnSpPr/>
+          <p:nvPr/>
+        </p:nvCxnSpPr>
+        <p:spPr>
+          <a:xfrm>
+            <a:off x="2709006" y="1115145"/>
+            <a:ext cx="0" cy="229430"/>
+          </a:xfrm>
+          <a:prstGeom prst="line">
+            <a:avLst/>
+          </a:prstGeom>
+          <a:ln w="19050"/>
+        </p:spPr>
+        <p:style>
+          <a:lnRef idx="1">
+            <a:schemeClr val="dk1"/>
+          </a:lnRef>
+          <a:fillRef idx="0">
+            <a:schemeClr val="dk1"/>
+          </a:fillRef>
+          <a:effectRef idx="0">
+            <a:schemeClr val="dk1"/>
+          </a:effectRef>
+          <a:fontRef idx="minor">
+            <a:schemeClr val="tx1"/>
+          </a:fontRef>
+        </p:style>
+      </p:cxnSp>
+      <p:cxnSp>
+        <p:nvCxnSpPr>
+          <p:cNvPr id="60" name="直線接點 59">
+            <a:extLst>
+              <a:ext uri="{FF2B5EF4-FFF2-40B4-BE49-F238E27FC236}">
+                <a16:creationId xmlns:a16="http://schemas.microsoft.com/office/drawing/2014/main" id="{EDB8ED24-40FE-0E6A-61C0-46CA7E0C7000}"/>
+              </a:ext>
+            </a:extLst>
+          </p:cNvPr>
+          <p:cNvCxnSpPr/>
+          <p:nvPr/>
+        </p:nvCxnSpPr>
+        <p:spPr>
+          <a:xfrm>
+            <a:off x="3204786" y="1126541"/>
+            <a:ext cx="0" cy="229430"/>
+          </a:xfrm>
+          <a:prstGeom prst="line">
+            <a:avLst/>
+          </a:prstGeom>
+          <a:ln w="19050"/>
+        </p:spPr>
+        <p:style>
+          <a:lnRef idx="1">
+            <a:schemeClr val="dk1"/>
+          </a:lnRef>
+          <a:fillRef idx="0">
+            <a:schemeClr val="dk1"/>
+          </a:fillRef>
+          <a:effectRef idx="0">
+            <a:schemeClr val="dk1"/>
+          </a:effectRef>
+          <a:fontRef idx="minor">
+            <a:schemeClr val="tx1"/>
+          </a:fontRef>
+        </p:style>
+      </p:cxnSp>
+      <p:cxnSp>
+        <p:nvCxnSpPr>
+          <p:cNvPr id="61" name="直線接點 60">
+            <a:extLst>
+              <a:ext uri="{FF2B5EF4-FFF2-40B4-BE49-F238E27FC236}">
+                <a16:creationId xmlns:a16="http://schemas.microsoft.com/office/drawing/2014/main" id="{48720282-0EC6-28D8-B209-95416A33C785}"/>
+              </a:ext>
+            </a:extLst>
+          </p:cNvPr>
+          <p:cNvCxnSpPr/>
+          <p:nvPr/>
+        </p:nvCxnSpPr>
+        <p:spPr>
+          <a:xfrm>
+            <a:off x="3721229" y="1126541"/>
+            <a:ext cx="0" cy="229430"/>
+          </a:xfrm>
+          <a:prstGeom prst="line">
+            <a:avLst/>
+          </a:prstGeom>
+          <a:ln w="19050"/>
+        </p:spPr>
+        <p:style>
+          <a:lnRef idx="1">
+            <a:schemeClr val="dk1"/>
+          </a:lnRef>
+          <a:fillRef idx="0">
+            <a:schemeClr val="dk1"/>
+          </a:fillRef>
+          <a:effectRef idx="0">
+            <a:schemeClr val="dk1"/>
+          </a:effectRef>
+          <a:fontRef idx="minor">
+            <a:schemeClr val="tx1"/>
+          </a:fontRef>
+        </p:style>
+      </p:cxnSp>
+      <p:cxnSp>
+        <p:nvCxnSpPr>
+          <p:cNvPr id="63" name="直線接點 62">
+            <a:extLst>
+              <a:ext uri="{FF2B5EF4-FFF2-40B4-BE49-F238E27FC236}">
+                <a16:creationId xmlns:a16="http://schemas.microsoft.com/office/drawing/2014/main" id="{007D70B1-38A8-962B-7798-D379C0AF869B}"/>
+              </a:ext>
+            </a:extLst>
+          </p:cNvPr>
+          <p:cNvCxnSpPr/>
+          <p:nvPr/>
+        </p:nvCxnSpPr>
+        <p:spPr>
+          <a:xfrm>
+            <a:off x="4245242" y="1126541"/>
+            <a:ext cx="0" cy="229430"/>
+          </a:xfrm>
+          <a:prstGeom prst="line">
+            <a:avLst/>
+          </a:prstGeom>
+          <a:ln w="19050"/>
+        </p:spPr>
+        <p:style>
+          <a:lnRef idx="1">
+            <a:schemeClr val="dk1"/>
+          </a:lnRef>
+          <a:fillRef idx="0">
+            <a:schemeClr val="dk1"/>
+          </a:fillRef>
+          <a:effectRef idx="0">
+            <a:schemeClr val="dk1"/>
+          </a:effectRef>
+          <a:fontRef idx="minor">
+            <a:schemeClr val="tx1"/>
+          </a:fontRef>
+        </p:style>
+      </p:cxnSp>
+      <p:cxnSp>
+        <p:nvCxnSpPr>
+          <p:cNvPr id="64" name="直線接點 63">
+            <a:extLst>
+              <a:ext uri="{FF2B5EF4-FFF2-40B4-BE49-F238E27FC236}">
+                <a16:creationId xmlns:a16="http://schemas.microsoft.com/office/drawing/2014/main" id="{118A5963-C648-8353-361F-2CD26FF52C6B}"/>
+              </a:ext>
+            </a:extLst>
+          </p:cNvPr>
+          <p:cNvCxnSpPr/>
+          <p:nvPr/>
+        </p:nvCxnSpPr>
+        <p:spPr>
+          <a:xfrm>
+            <a:off x="4749291" y="1122974"/>
+            <a:ext cx="0" cy="229430"/>
+          </a:xfrm>
+          <a:prstGeom prst="line">
+            <a:avLst/>
+          </a:prstGeom>
+          <a:ln w="19050"/>
+        </p:spPr>
+        <p:style>
+          <a:lnRef idx="1">
+            <a:schemeClr val="dk1"/>
+          </a:lnRef>
+          <a:fillRef idx="0">
+            <a:schemeClr val="dk1"/>
+          </a:fillRef>
+          <a:effectRef idx="0">
+            <a:schemeClr val="dk1"/>
+          </a:effectRef>
+          <a:fontRef idx="minor">
+            <a:schemeClr val="tx1"/>
+          </a:fontRef>
+        </p:style>
+      </p:cxnSp>
+      <p:cxnSp>
+        <p:nvCxnSpPr>
+          <p:cNvPr id="65" name="直線接點 64">
+            <a:extLst>
+              <a:ext uri="{FF2B5EF4-FFF2-40B4-BE49-F238E27FC236}">
+                <a16:creationId xmlns:a16="http://schemas.microsoft.com/office/drawing/2014/main" id="{3606C582-970E-2968-D889-D3733C72BD56}"/>
+              </a:ext>
+            </a:extLst>
+          </p:cNvPr>
+          <p:cNvCxnSpPr/>
+          <p:nvPr/>
+        </p:nvCxnSpPr>
+        <p:spPr>
+          <a:xfrm>
+            <a:off x="5245071" y="1121930"/>
+            <a:ext cx="0" cy="229430"/>
+          </a:xfrm>
+          <a:prstGeom prst="line">
+            <a:avLst/>
+          </a:prstGeom>
+          <a:ln w="19050"/>
+        </p:spPr>
+        <p:style>
+          <a:lnRef idx="1">
+            <a:schemeClr val="dk1"/>
+          </a:lnRef>
+          <a:fillRef idx="0">
+            <a:schemeClr val="dk1"/>
+          </a:fillRef>
+          <a:effectRef idx="0">
+            <a:schemeClr val="dk1"/>
+          </a:effectRef>
+          <a:fontRef idx="minor">
+            <a:schemeClr val="tx1"/>
+          </a:fontRef>
+        </p:style>
+      </p:cxnSp>
+      <p:cxnSp>
+        <p:nvCxnSpPr>
+          <p:cNvPr id="67" name="直線接點 66">
+            <a:extLst>
+              <a:ext uri="{FF2B5EF4-FFF2-40B4-BE49-F238E27FC236}">
+                <a16:creationId xmlns:a16="http://schemas.microsoft.com/office/drawing/2014/main" id="{D2819800-88D6-6853-39A2-6022B85F1E9A}"/>
+              </a:ext>
+            </a:extLst>
+          </p:cNvPr>
+          <p:cNvCxnSpPr/>
+          <p:nvPr/>
+        </p:nvCxnSpPr>
+        <p:spPr>
+          <a:xfrm>
+            <a:off x="5761514" y="1121930"/>
+            <a:ext cx="0" cy="229430"/>
+          </a:xfrm>
+          <a:prstGeom prst="line">
+            <a:avLst/>
+          </a:prstGeom>
+          <a:ln w="19050"/>
+        </p:spPr>
+        <p:style>
+          <a:lnRef idx="1">
+            <a:schemeClr val="dk1"/>
+          </a:lnRef>
+          <a:fillRef idx="0">
+            <a:schemeClr val="dk1"/>
+          </a:fillRef>
+          <a:effectRef idx="0">
+            <a:schemeClr val="dk1"/>
+          </a:effectRef>
+          <a:fontRef idx="minor">
+            <a:schemeClr val="tx1"/>
+          </a:fontRef>
+        </p:style>
+      </p:cxnSp>
+      <p:cxnSp>
+        <p:nvCxnSpPr>
+          <p:cNvPr id="68" name="直線接點 67">
+            <a:extLst>
+              <a:ext uri="{FF2B5EF4-FFF2-40B4-BE49-F238E27FC236}">
+                <a16:creationId xmlns:a16="http://schemas.microsoft.com/office/drawing/2014/main" id="{CA996563-9969-975E-4383-7FF0E773733A}"/>
+              </a:ext>
+            </a:extLst>
+          </p:cNvPr>
+          <p:cNvCxnSpPr/>
+          <p:nvPr/>
+        </p:nvCxnSpPr>
+        <p:spPr>
+          <a:xfrm>
+            <a:off x="6285527" y="1121930"/>
+            <a:ext cx="0" cy="229430"/>
+          </a:xfrm>
+          <a:prstGeom prst="line">
+            <a:avLst/>
+          </a:prstGeom>
+          <a:ln w="19050"/>
+        </p:spPr>
+        <p:style>
+          <a:lnRef idx="1">
+            <a:schemeClr val="dk1"/>
+          </a:lnRef>
+          <a:fillRef idx="0">
+            <a:schemeClr val="dk1"/>
+          </a:fillRef>
+          <a:effectRef idx="0">
+            <a:schemeClr val="dk1"/>
+          </a:effectRef>
+          <a:fontRef idx="minor">
+            <a:schemeClr val="tx1"/>
+          </a:fontRef>
+        </p:style>
+      </p:cxnSp>
+      <p:cxnSp>
+        <p:nvCxnSpPr>
+          <p:cNvPr id="74" name="直線接點 73">
+            <a:extLst>
+              <a:ext uri="{FF2B5EF4-FFF2-40B4-BE49-F238E27FC236}">
+                <a16:creationId xmlns:a16="http://schemas.microsoft.com/office/drawing/2014/main" id="{D46EF59B-75BE-02C1-6013-8F6014555889}"/>
+              </a:ext>
+            </a:extLst>
+          </p:cNvPr>
+          <p:cNvCxnSpPr/>
+          <p:nvPr/>
+        </p:nvCxnSpPr>
+        <p:spPr>
+          <a:xfrm>
+            <a:off x="6795799" y="1143139"/>
+            <a:ext cx="0" cy="229430"/>
+          </a:xfrm>
+          <a:prstGeom prst="line">
+            <a:avLst/>
+          </a:prstGeom>
+          <a:ln w="19050"/>
+        </p:spPr>
+        <p:style>
+          <a:lnRef idx="1">
+            <a:schemeClr val="dk1"/>
+          </a:lnRef>
+          <a:fillRef idx="0">
+            <a:schemeClr val="dk1"/>
+          </a:fillRef>
+          <a:effectRef idx="0">
+            <a:schemeClr val="dk1"/>
+          </a:effectRef>
+          <a:fontRef idx="minor">
+            <a:schemeClr val="tx1"/>
+          </a:fontRef>
+        </p:style>
+      </p:cxnSp>
+      <p:cxnSp>
+        <p:nvCxnSpPr>
+          <p:cNvPr id="75" name="直線接點 74">
+            <a:extLst>
+              <a:ext uri="{FF2B5EF4-FFF2-40B4-BE49-F238E27FC236}">
+                <a16:creationId xmlns:a16="http://schemas.microsoft.com/office/drawing/2014/main" id="{66C85B76-8A18-6D7C-6002-944EE71C6414}"/>
+              </a:ext>
+            </a:extLst>
+          </p:cNvPr>
+          <p:cNvCxnSpPr/>
+          <p:nvPr/>
+        </p:nvCxnSpPr>
+        <p:spPr>
+          <a:xfrm>
+            <a:off x="7291579" y="1142095"/>
+            <a:ext cx="0" cy="229430"/>
+          </a:xfrm>
+          <a:prstGeom prst="line">
+            <a:avLst/>
+          </a:prstGeom>
+          <a:ln w="19050"/>
+        </p:spPr>
+        <p:style>
+          <a:lnRef idx="1">
+            <a:schemeClr val="dk1"/>
+          </a:lnRef>
+          <a:fillRef idx="0">
+            <a:schemeClr val="dk1"/>
+          </a:fillRef>
+          <a:effectRef idx="0">
+            <a:schemeClr val="dk1"/>
+          </a:effectRef>
+          <a:fontRef idx="minor">
+            <a:schemeClr val="tx1"/>
+          </a:fontRef>
+        </p:style>
+      </p:cxnSp>
+      <p:cxnSp>
+        <p:nvCxnSpPr>
+          <p:cNvPr id="76" name="直線接點 75">
+            <a:extLst>
+              <a:ext uri="{FF2B5EF4-FFF2-40B4-BE49-F238E27FC236}">
+                <a16:creationId xmlns:a16="http://schemas.microsoft.com/office/drawing/2014/main" id="{B91CE342-E267-BCFC-AC85-5449B3F88EBC}"/>
+              </a:ext>
+            </a:extLst>
+          </p:cNvPr>
+          <p:cNvCxnSpPr/>
+          <p:nvPr/>
+        </p:nvCxnSpPr>
+        <p:spPr>
+          <a:xfrm>
+            <a:off x="7808022" y="1142095"/>
+            <a:ext cx="0" cy="229430"/>
+          </a:xfrm>
+          <a:prstGeom prst="line">
+            <a:avLst/>
+          </a:prstGeom>
+          <a:ln w="19050"/>
+        </p:spPr>
+        <p:style>
+          <a:lnRef idx="1">
+            <a:schemeClr val="dk1"/>
+          </a:lnRef>
+          <a:fillRef idx="0">
+            <a:schemeClr val="dk1"/>
+          </a:fillRef>
+          <a:effectRef idx="0">
+            <a:schemeClr val="dk1"/>
+          </a:effectRef>
+          <a:fontRef idx="minor">
+            <a:schemeClr val="tx1"/>
+          </a:fontRef>
+        </p:style>
+      </p:cxnSp>
+      <p:cxnSp>
+        <p:nvCxnSpPr>
+          <p:cNvPr id="77" name="直線接點 76">
+            <a:extLst>
+              <a:ext uri="{FF2B5EF4-FFF2-40B4-BE49-F238E27FC236}">
+                <a16:creationId xmlns:a16="http://schemas.microsoft.com/office/drawing/2014/main" id="{EAEE536F-62B7-486D-8B9D-C1875E4831C3}"/>
+              </a:ext>
+            </a:extLst>
+          </p:cNvPr>
+          <p:cNvCxnSpPr/>
+          <p:nvPr/>
+        </p:nvCxnSpPr>
+        <p:spPr>
+          <a:xfrm>
+            <a:off x="8332035" y="1142095"/>
+            <a:ext cx="0" cy="229430"/>
+          </a:xfrm>
+          <a:prstGeom prst="line">
+            <a:avLst/>
+          </a:prstGeom>
+          <a:ln w="19050"/>
+        </p:spPr>
+        <p:style>
+          <a:lnRef idx="1">
+            <a:schemeClr val="dk1"/>
+          </a:lnRef>
+          <a:fillRef idx="0">
+            <a:schemeClr val="dk1"/>
+          </a:fillRef>
+          <a:effectRef idx="0">
+            <a:schemeClr val="dk1"/>
+          </a:effectRef>
+          <a:fontRef idx="minor">
+            <a:schemeClr val="tx1"/>
+          </a:fontRef>
+        </p:style>
+      </p:cxnSp>
+      <p:cxnSp>
+        <p:nvCxnSpPr>
+          <p:cNvPr id="82" name="直線接點 81">
+            <a:extLst>
+              <a:ext uri="{FF2B5EF4-FFF2-40B4-BE49-F238E27FC236}">
+                <a16:creationId xmlns:a16="http://schemas.microsoft.com/office/drawing/2014/main" id="{8B8814A9-2E96-8448-8067-29771395DD71}"/>
+              </a:ext>
+            </a:extLst>
+          </p:cNvPr>
+          <p:cNvCxnSpPr/>
+          <p:nvPr/>
+        </p:nvCxnSpPr>
+        <p:spPr>
+          <a:xfrm>
+            <a:off x="8857663" y="1148315"/>
+            <a:ext cx="0" cy="229430"/>
+          </a:xfrm>
+          <a:prstGeom prst="line">
+            <a:avLst/>
+          </a:prstGeom>
+          <a:ln w="19050"/>
+        </p:spPr>
+        <p:style>
+          <a:lnRef idx="1">
+            <a:schemeClr val="dk1"/>
+          </a:lnRef>
+          <a:fillRef idx="0">
+            <a:schemeClr val="dk1"/>
+          </a:fillRef>
+          <a:effectRef idx="0">
+            <a:schemeClr val="dk1"/>
+          </a:effectRef>
+          <a:fontRef idx="minor">
+            <a:schemeClr val="tx1"/>
+          </a:fontRef>
+        </p:style>
+      </p:cxnSp>
+      <mc:AlternateContent xmlns:mc="http://schemas.openxmlformats.org/markup-compatibility/2006">
+        <mc:Choice xmlns:a14="http://schemas.microsoft.com/office/drawing/2010/main" Requires="a14">
+          <p:sp>
+            <p:nvSpPr>
+              <p:cNvPr id="83" name="文字方塊 82">
+                <a:extLst>
+                  <a:ext uri="{FF2B5EF4-FFF2-40B4-BE49-F238E27FC236}">
+                    <a16:creationId xmlns:a16="http://schemas.microsoft.com/office/drawing/2014/main" id="{A03ED766-D9A9-08AA-9645-6E8643210DB7}"/>
+                  </a:ext>
+                </a:extLst>
+              </p:cNvPr>
+              <p:cNvSpPr txBox="1"/>
+              <p:nvPr/>
+            </p:nvSpPr>
+            <p:spPr>
+              <a:xfrm>
+                <a:off x="3306189" y="1846666"/>
+                <a:ext cx="874407" cy="437171"/>
+              </a:xfrm>
+              <a:prstGeom prst="rect">
+                <a:avLst/>
+              </a:prstGeom>
+              <a:noFill/>
+            </p:spPr>
+            <p:txBody>
+              <a:bodyPr wrap="none" rtlCol="0">
+                <a:spAutoFit/>
+              </a:bodyPr>
+              <a:lstStyle>
+                <a:defPPr>
+                  <a:defRPr lang="en-US"/>
+                </a:defPPr>
+                <a:lvl1pPr>
+                  <a:defRPr sz="2241" i="1">
+                    <a:solidFill>
+                      <a:schemeClr val="tx1">
+                        <a:lumMod val="50000"/>
+                        <a:lumOff val="50000"/>
+                      </a:schemeClr>
+                    </a:solidFill>
+                    <a:latin typeface="Cambria Math" panose="02040503050406030204" pitchFamily="18" charset="0"/>
+                  </a:defRPr>
+                </a:lvl1pPr>
+              </a:lstStyle>
+              <a:p>
+                <a14:m>
+                  <m:oMathPara xmlns:m="http://schemas.openxmlformats.org/officeDocument/2006/math">
+                    <m:oMathParaPr>
+                      <m:jc m:val="centerGroup"/>
+                    </m:oMathParaPr>
+                    <m:oMath xmlns:m="http://schemas.openxmlformats.org/officeDocument/2006/math">
+                      <m:sSub>
+                        <m:sSubPr>
+                          <m:ctrlPr>
+                            <a:rPr lang="en-US" altLang="zh-TW"/>
+                          </m:ctrlPr>
+                        </m:sSubPr>
+                        <m:e>
+                          <m:r>
+                            <m:rPr>
+                              <m:sty m:val="p"/>
+                            </m:rPr>
+                            <a:rPr lang="en-US" altLang="zh-TW"/>
+                            <m:t>θ</m:t>
+                          </m:r>
+                        </m:e>
+                        <m:sub>
+                          <m:r>
+                            <a:rPr lang="en-US" altLang="zh-TW"/>
+                            <m:t>𝑘</m:t>
+                          </m:r>
+                        </m:sub>
+                      </m:sSub>
+                      <m:r>
+                        <m:rPr>
+                          <m:nor/>
+                        </m:rPr>
+                        <a:rPr lang="en-US" altLang="zh-TW" i="0"/>
+                        <m:t>[</m:t>
+                      </m:r>
+                      <m:r>
+                        <m:rPr>
+                          <m:nor/>
+                        </m:rPr>
+                        <a:rPr lang="en-US" altLang="zh-TW" i="0"/>
+                        <m:t>s</m:t>
+                      </m:r>
+                      <m:r>
+                        <m:rPr>
+                          <m:nor/>
+                        </m:rPr>
+                        <a:rPr lang="en-US" altLang="zh-TW" i="0"/>
+                        <m:t>]</m:t>
+                      </m:r>
+                    </m:oMath>
+                  </m:oMathPara>
+                </a14:m>
+                <a:endParaRPr lang="en-US" altLang="zh-TW" i="0" dirty="0"/>
+              </a:p>
+            </p:txBody>
+          </p:sp>
+        </mc:Choice>
+        <mc:Fallback>
+          <p:sp>
+            <p:nvSpPr>
+              <p:cNvPr id="83" name="文字方塊 82">
+                <a:extLst>
+                  <a:ext uri="{FF2B5EF4-FFF2-40B4-BE49-F238E27FC236}">
+                    <a16:creationId xmlns:a16="http://schemas.microsoft.com/office/drawing/2014/main" id="{A03ED766-D9A9-08AA-9645-6E8643210DB7}"/>
+                  </a:ext>
+                </a:extLst>
+              </p:cNvPr>
+              <p:cNvSpPr txBox="1">
+                <a:spLocks noRot="1" noChangeAspect="1" noMove="1" noResize="1" noEditPoints="1" noAdjustHandles="1" noChangeArrowheads="1" noChangeShapeType="1" noTextEdit="1"/>
+              </p:cNvSpPr>
+              <p:nvPr/>
+            </p:nvSpPr>
+            <p:spPr>
+              <a:xfrm>
+                <a:off x="3306189" y="1846666"/>
+                <a:ext cx="874407" cy="437171"/>
+              </a:xfrm>
+              <a:prstGeom prst="rect">
+                <a:avLst/>
+              </a:prstGeom>
+              <a:blipFill>
+                <a:blip r:embed="rId6"/>
+                <a:stretch>
+                  <a:fillRect r="-1389" b="-19444"/>
+                </a:stretch>
+              </a:blipFill>
+            </p:spPr>
+            <p:txBody>
+              <a:bodyPr/>
+              <a:lstStyle/>
+              <a:p>
+                <a:r>
+                  <a:rPr lang="zh-TW" altLang="en-US">
+                    <a:noFill/>
+                  </a:rPr>
+                  <a:t> </a:t>
+                </a:r>
+              </a:p>
+            </p:txBody>
+          </p:sp>
+        </mc:Fallback>
+      </mc:AlternateContent>
+      <mc:AlternateContent xmlns:mc="http://schemas.openxmlformats.org/markup-compatibility/2006">
+        <mc:Choice xmlns:a14="http://schemas.microsoft.com/office/drawing/2010/main" Requires="a14">
+          <p:sp>
+            <p:nvSpPr>
+              <p:cNvPr id="84" name="文字方塊 83">
+                <a:extLst>
+                  <a:ext uri="{FF2B5EF4-FFF2-40B4-BE49-F238E27FC236}">
+                    <a16:creationId xmlns:a16="http://schemas.microsoft.com/office/drawing/2014/main" id="{2FE40BC7-59ED-A9BD-1E52-F7726A864A63}"/>
+                  </a:ext>
+                </a:extLst>
+              </p:cNvPr>
+              <p:cNvSpPr txBox="1"/>
+              <p:nvPr/>
+            </p:nvSpPr>
+            <p:spPr>
+              <a:xfrm>
+                <a:off x="5389176" y="1853208"/>
+                <a:ext cx="874407" cy="437171"/>
+              </a:xfrm>
+              <a:prstGeom prst="rect">
+                <a:avLst/>
+              </a:prstGeom>
+              <a:noFill/>
+            </p:spPr>
+            <p:txBody>
+              <a:bodyPr wrap="none" rtlCol="0">
+                <a:spAutoFit/>
+              </a:bodyPr>
+              <a:lstStyle>
+                <a:defPPr>
+                  <a:defRPr lang="en-US"/>
+                </a:defPPr>
+                <a:lvl1pPr>
+                  <a:defRPr sz="2241" i="1">
+                    <a:solidFill>
+                      <a:schemeClr val="tx1">
+                        <a:lumMod val="50000"/>
+                        <a:lumOff val="50000"/>
+                      </a:schemeClr>
+                    </a:solidFill>
+                    <a:latin typeface="Cambria Math" panose="02040503050406030204" pitchFamily="18" charset="0"/>
+                  </a:defRPr>
+                </a:lvl1pPr>
+              </a:lstStyle>
+              <a:p>
+                <a14:m>
+                  <m:oMathPara xmlns:m="http://schemas.openxmlformats.org/officeDocument/2006/math">
+                    <m:oMathParaPr>
+                      <m:jc m:val="centerGroup"/>
+                    </m:oMathParaPr>
+                    <m:oMath xmlns:m="http://schemas.openxmlformats.org/officeDocument/2006/math">
+                      <m:sSub>
+                        <m:sSubPr>
+                          <m:ctrlPr>
+                            <a:rPr lang="en-US" altLang="zh-TW"/>
+                          </m:ctrlPr>
+                        </m:sSubPr>
+                        <m:e>
+                          <m:r>
+                            <m:rPr>
+                              <m:sty m:val="p"/>
+                            </m:rPr>
+                            <a:rPr lang="en-US" altLang="zh-TW"/>
+                            <m:t>θ</m:t>
+                          </m:r>
+                        </m:e>
+                        <m:sub>
+                          <m:r>
+                            <a:rPr lang="en-US" altLang="zh-TW"/>
+                            <m:t>𝑘</m:t>
+                          </m:r>
+                        </m:sub>
+                      </m:sSub>
+                      <m:r>
+                        <m:rPr>
+                          <m:nor/>
+                        </m:rPr>
+                        <a:rPr lang="en-US" altLang="zh-TW" i="0"/>
+                        <m:t>[</m:t>
+                      </m:r>
+                      <m:r>
+                        <m:rPr>
+                          <m:nor/>
+                        </m:rPr>
+                        <a:rPr lang="en-US" altLang="zh-TW" i="0"/>
+                        <m:t>s</m:t>
+                      </m:r>
+                      <m:r>
+                        <m:rPr>
+                          <m:nor/>
+                        </m:rPr>
+                        <a:rPr lang="en-US" altLang="zh-TW" i="0"/>
+                        <m:t>]</m:t>
+                      </m:r>
+                    </m:oMath>
+                  </m:oMathPara>
+                </a14:m>
+                <a:endParaRPr lang="en-US" altLang="zh-TW" i="0" dirty="0"/>
+              </a:p>
+            </p:txBody>
+          </p:sp>
+        </mc:Choice>
+        <mc:Fallback>
+          <p:sp>
+            <p:nvSpPr>
+              <p:cNvPr id="84" name="文字方塊 83">
+                <a:extLst>
+                  <a:ext uri="{FF2B5EF4-FFF2-40B4-BE49-F238E27FC236}">
+                    <a16:creationId xmlns:a16="http://schemas.microsoft.com/office/drawing/2014/main" id="{2FE40BC7-59ED-A9BD-1E52-F7726A864A63}"/>
+                  </a:ext>
+                </a:extLst>
+              </p:cNvPr>
+              <p:cNvSpPr txBox="1">
+                <a:spLocks noRot="1" noChangeAspect="1" noMove="1" noResize="1" noEditPoints="1" noAdjustHandles="1" noChangeArrowheads="1" noChangeShapeType="1" noTextEdit="1"/>
+              </p:cNvSpPr>
+              <p:nvPr/>
+            </p:nvSpPr>
+            <p:spPr>
+              <a:xfrm>
+                <a:off x="5389176" y="1853208"/>
+                <a:ext cx="874407" cy="437171"/>
+              </a:xfrm>
+              <a:prstGeom prst="rect">
+                <a:avLst/>
+              </a:prstGeom>
+              <a:blipFill>
+                <a:blip r:embed="rId7"/>
+                <a:stretch>
+                  <a:fillRect r="-2098" b="-19444"/>
+                </a:stretch>
+              </a:blipFill>
+            </p:spPr>
+            <p:txBody>
+              <a:bodyPr/>
+              <a:lstStyle/>
+              <a:p>
+                <a:r>
+                  <a:rPr lang="zh-TW" altLang="en-US">
+                    <a:noFill/>
+                  </a:rPr>
+                  <a:t> </a:t>
+                </a:r>
+              </a:p>
+            </p:txBody>
+          </p:sp>
+        </mc:Fallback>
+      </mc:AlternateContent>
+      <mc:AlternateContent xmlns:mc="http://schemas.openxmlformats.org/markup-compatibility/2006">
+        <mc:Choice xmlns:a14="http://schemas.microsoft.com/office/drawing/2010/main" Requires="a14">
+          <p:sp>
+            <p:nvSpPr>
+              <p:cNvPr id="85" name="文字方塊 84">
+                <a:extLst>
+                  <a:ext uri="{FF2B5EF4-FFF2-40B4-BE49-F238E27FC236}">
+                    <a16:creationId xmlns:a16="http://schemas.microsoft.com/office/drawing/2014/main" id="{F999476D-F203-E8AB-3056-D9D28D143F59}"/>
+                  </a:ext>
+                </a:extLst>
+              </p:cNvPr>
+              <p:cNvSpPr txBox="1"/>
+              <p:nvPr/>
+            </p:nvSpPr>
+            <p:spPr>
+              <a:xfrm>
+                <a:off x="7484072" y="1870570"/>
+                <a:ext cx="874407" cy="437171"/>
+              </a:xfrm>
+              <a:prstGeom prst="rect">
+                <a:avLst/>
+              </a:prstGeom>
+              <a:noFill/>
+            </p:spPr>
+            <p:txBody>
+              <a:bodyPr wrap="none" rtlCol="0">
+                <a:spAutoFit/>
+              </a:bodyPr>
+              <a:lstStyle>
+                <a:defPPr>
+                  <a:defRPr lang="en-US"/>
+                </a:defPPr>
+                <a:lvl1pPr>
+                  <a:defRPr sz="2241" i="1">
+                    <a:solidFill>
+                      <a:schemeClr val="tx1">
+                        <a:lumMod val="50000"/>
+                        <a:lumOff val="50000"/>
+                      </a:schemeClr>
+                    </a:solidFill>
+                    <a:latin typeface="Cambria Math" panose="02040503050406030204" pitchFamily="18" charset="0"/>
+                  </a:defRPr>
+                </a:lvl1pPr>
+              </a:lstStyle>
+              <a:p>
+                <a14:m>
+                  <m:oMathPara xmlns:m="http://schemas.openxmlformats.org/officeDocument/2006/math">
+                    <m:oMathParaPr>
+                      <m:jc m:val="centerGroup"/>
+                    </m:oMathParaPr>
+                    <m:oMath xmlns:m="http://schemas.openxmlformats.org/officeDocument/2006/math">
+                      <m:sSub>
+                        <m:sSubPr>
+                          <m:ctrlPr>
+                            <a:rPr lang="en-US" altLang="zh-TW"/>
+                          </m:ctrlPr>
+                        </m:sSubPr>
+                        <m:e>
+                          <m:r>
+                            <m:rPr>
+                              <m:sty m:val="p"/>
+                            </m:rPr>
+                            <a:rPr lang="en-US" altLang="zh-TW"/>
+                            <m:t>θ</m:t>
+                          </m:r>
+                        </m:e>
+                        <m:sub>
+                          <m:r>
+                            <a:rPr lang="en-US" altLang="zh-TW"/>
+                            <m:t>𝑘</m:t>
+                          </m:r>
+                        </m:sub>
+                      </m:sSub>
+                      <m:r>
+                        <m:rPr>
+                          <m:nor/>
+                        </m:rPr>
+                        <a:rPr lang="en-US" altLang="zh-TW" i="0"/>
+                        <m:t>[</m:t>
+                      </m:r>
+                      <m:r>
+                        <m:rPr>
+                          <m:nor/>
+                        </m:rPr>
+                        <a:rPr lang="en-US" altLang="zh-TW" i="0"/>
+                        <m:t>s</m:t>
+                      </m:r>
+                      <m:r>
+                        <m:rPr>
+                          <m:nor/>
+                        </m:rPr>
+                        <a:rPr lang="en-US" altLang="zh-TW" i="0"/>
+                        <m:t>]</m:t>
+                      </m:r>
+                    </m:oMath>
+                  </m:oMathPara>
+                </a14:m>
+                <a:endParaRPr lang="en-US" altLang="zh-TW" i="0" dirty="0"/>
+              </a:p>
+            </p:txBody>
+          </p:sp>
+        </mc:Choice>
+        <mc:Fallback>
+          <p:sp>
+            <p:nvSpPr>
+              <p:cNvPr id="85" name="文字方塊 84">
+                <a:extLst>
+                  <a:ext uri="{FF2B5EF4-FFF2-40B4-BE49-F238E27FC236}">
+                    <a16:creationId xmlns:a16="http://schemas.microsoft.com/office/drawing/2014/main" id="{F999476D-F203-E8AB-3056-D9D28D143F59}"/>
+                  </a:ext>
+                </a:extLst>
+              </p:cNvPr>
+              <p:cNvSpPr txBox="1">
+                <a:spLocks noRot="1" noChangeAspect="1" noMove="1" noResize="1" noEditPoints="1" noAdjustHandles="1" noChangeArrowheads="1" noChangeShapeType="1" noTextEdit="1"/>
+              </p:cNvSpPr>
+              <p:nvPr/>
+            </p:nvSpPr>
+            <p:spPr>
+              <a:xfrm>
+                <a:off x="7484072" y="1870570"/>
+                <a:ext cx="874407" cy="437171"/>
+              </a:xfrm>
+              <a:prstGeom prst="rect">
+                <a:avLst/>
+              </a:prstGeom>
+              <a:blipFill>
+                <a:blip r:embed="rId8"/>
+                <a:stretch>
+                  <a:fillRect r="-1399" b="-19444"/>
+                </a:stretch>
+              </a:blipFill>
+            </p:spPr>
+            <p:txBody>
+              <a:bodyPr/>
+              <a:lstStyle/>
+              <a:p>
+                <a:r>
+                  <a:rPr lang="zh-TW" altLang="en-US">
+                    <a:noFill/>
+                  </a:rPr>
+                  <a:t> </a:t>
+                </a:r>
+              </a:p>
+            </p:txBody>
+          </p:sp>
+        </mc:Fallback>
+      </mc:AlternateContent>
     </p:spTree>
     <p:extLst>
       <p:ext uri="{BB962C8B-B14F-4D97-AF65-F5344CB8AC3E}">

</xml_diff>